<commit_message>
Presentation and documentation updated.
95% done
</commit_message>
<xml_diff>
--- a/Система за избор на песен.pptx
+++ b/Система за избор на песен.pptx
@@ -24,9 +24,11 @@
     <p:sldId id="263" r:id="rId18"/>
     <p:sldId id="270" r:id="rId19"/>
     <p:sldId id="264" r:id="rId20"/>
-    <p:sldId id="265" r:id="rId21"/>
-    <p:sldId id="269" r:id="rId22"/>
-    <p:sldId id="277" r:id="rId23"/>
+    <p:sldId id="269" r:id="rId21"/>
+    <p:sldId id="280" r:id="rId22"/>
+    <p:sldId id="281" r:id="rId23"/>
+    <p:sldId id="282" r:id="rId24"/>
+    <p:sldId id="277" r:id="rId25"/>
   </p:sldIdLst>
   <p:sldSz cx="12192000" cy="6858000"/>
   <p:notesSz cx="6858000" cy="9144000"/>
@@ -125,6 +127,11 @@
       </a:defRPr>
     </a:lvl9pPr>
   </p:defaultTextStyle>
+  <p:extLst>
+    <p:ext uri="{EFAFB233-063F-42B5-8137-9DF3F51BA10A}">
+      <p15:sldGuideLst xmlns:p15="http://schemas.microsoft.com/office/powerpoint/2012/main"/>
+    </p:ext>
+  </p:extLst>
 </p:presentation>
 </file>
 
@@ -13417,6 +13424,18 @@
   <p:clrMapOvr>
     <a:masterClrMapping/>
   </p:clrMapOvr>
+  <mc:AlternateContent xmlns:mc="http://schemas.openxmlformats.org/markup-compatibility/2006">
+    <mc:Choice xmlns:p14="http://schemas.microsoft.com/office/powerpoint/2010/main" Requires="p14">
+      <p:transition spd="slow" p14:dur="1500">
+        <p:split orient="vert"/>
+      </p:transition>
+    </mc:Choice>
+    <mc:Fallback>
+      <p:transition spd="slow">
+        <p:split orient="vert"/>
+      </p:transition>
+    </mc:Fallback>
+  </mc:AlternateContent>
 </p:sld>
 </file>
 
@@ -13534,7 +13553,7 @@
                 <a:ea typeface="Calibri" panose="020F0502020204030204" pitchFamily="34" charset="0"/>
                 <a:cs typeface="Times New Roman" panose="02020603050405020304" pitchFamily="18" charset="0"/>
               </a:rPr>
-              <a:t>създаване на задачи от високо и ниско ниво</a:t>
+              <a:t>Създаване на задачи от високо и ниско ниво</a:t>
             </a:r>
           </a:p>
           <a:p>
@@ -13549,7 +13568,7 @@
                 <a:ea typeface="Calibri" panose="020F0502020204030204" pitchFamily="34" charset="0"/>
                 <a:cs typeface="Times New Roman" panose="02020603050405020304" pitchFamily="18" charset="0"/>
               </a:rPr>
-              <a:t>информация за ресурси (работни, материални, ценови)</a:t>
+              <a:t>Информация за ресурси (работни, материални, ценови)</a:t>
             </a:r>
             <a:endParaRPr lang="en-US" dirty="0">
               <a:effectLst/>
@@ -13615,7 +13634,7 @@
                 <a:ea typeface="Calibri" panose="020F0502020204030204" pitchFamily="34" charset="0"/>
                 <a:cs typeface="Times New Roman" panose="02020603050405020304" pitchFamily="18" charset="0"/>
               </a:rPr>
-              <a:t>задаване на срокове</a:t>
+              <a:t>Задаване на срокове</a:t>
             </a:r>
           </a:p>
           <a:p>
@@ -13630,7 +13649,7 @@
                 <a:ea typeface="Calibri" panose="020F0502020204030204" pitchFamily="34" charset="0"/>
                 <a:cs typeface="Times New Roman" panose="02020603050405020304" pitchFamily="18" charset="0"/>
               </a:rPr>
-              <a:t>разпределяне на задачите между членовете на екипа</a:t>
+              <a:t>Разпределяне на задачите между членовете на екипа</a:t>
             </a:r>
           </a:p>
           <a:p>
@@ -13645,7 +13664,7 @@
                 <a:ea typeface="Calibri" panose="020F0502020204030204" pitchFamily="34" charset="0"/>
                 <a:cs typeface="Times New Roman" panose="02020603050405020304" pitchFamily="18" charset="0"/>
               </a:rPr>
-              <a:t>бюджетиране</a:t>
+              <a:t>Бюджетиране</a:t>
             </a:r>
           </a:p>
           <a:p>
@@ -13663,7 +13682,7 @@
                 <a:ea typeface="Calibri" panose="020F0502020204030204" pitchFamily="34" charset="0"/>
                 <a:cs typeface="Times New Roman" panose="02020603050405020304" pitchFamily="18" charset="0"/>
               </a:rPr>
-              <a:t>изготвяне на отчети (</a:t>
+              <a:t>Изготвяне на отчети (</a:t>
             </a:r>
             <a:r>
               <a:rPr lang="en-US" dirty="0">
@@ -13730,6 +13749,18 @@
   <p:clrMapOvr>
     <a:masterClrMapping/>
   </p:clrMapOvr>
+  <mc:AlternateContent xmlns:mc="http://schemas.openxmlformats.org/markup-compatibility/2006">
+    <mc:Choice xmlns:p14="http://schemas.microsoft.com/office/powerpoint/2010/main" Requires="p14">
+      <p:transition spd="slow" p14:dur="1500">
+        <p:split orient="vert"/>
+      </p:transition>
+    </mc:Choice>
+    <mc:Fallback>
+      <p:transition spd="slow">
+        <p:split orient="vert"/>
+      </p:transition>
+    </mc:Fallback>
+  </mc:AlternateContent>
 </p:sld>
 </file>
 
@@ -13866,6 +13897,9 @@
   <p:clrMapOvr>
     <a:masterClrMapping/>
   </p:clrMapOvr>
+  <p:transition spd="slow">
+    <p:randomBar dir="vert"/>
+  </p:transition>
 </p:sld>
 </file>
 
@@ -13977,6 +14011,9 @@
   <p:clrMapOvr>
     <a:masterClrMapping/>
   </p:clrMapOvr>
+  <p:transition spd="slow">
+    <p:push dir="u"/>
+  </p:transition>
 </p:sld>
 </file>
 
@@ -14077,6 +14114,9 @@
   <p:clrMapOvr>
     <a:masterClrMapping/>
   </p:clrMapOvr>
+  <p:transition spd="med">
+    <p:pull/>
+  </p:transition>
 </p:sld>
 </file>
 
@@ -14147,7 +14187,7 @@
         </p:nvSpPr>
         <p:spPr>
           <a:xfrm>
-            <a:off x="1098411" y="2006595"/>
+            <a:off x="1008764" y="2006595"/>
             <a:ext cx="10331589" cy="4780283"/>
           </a:xfrm>
         </p:spPr>
@@ -14187,7 +14227,15 @@
           <a:p>
             <a:r>
               <a:rPr lang="ru-RU" sz="2200" dirty="0" err="1"/>
-              <a:t>Производителност</a:t>
+              <a:t>Повишаване</a:t>
+            </a:r>
+            <a:r>
+              <a:rPr lang="ru-RU" sz="2200" dirty="0"/>
+              <a:t> на </a:t>
+            </a:r>
+            <a:r>
+              <a:rPr lang="ru-RU" sz="2200" dirty="0" err="1"/>
+              <a:t>производителност</a:t>
             </a:r>
             <a:r>
               <a:rPr lang="ru-RU" sz="2200" dirty="0"/>
@@ -14308,87 +14356,50 @@
       </p:sp>
       <p:pic>
         <p:nvPicPr>
-          <p:cNvPr id="6" name="graphics9">
+          <p:cNvPr id="13" name="Картина 12">
             <a:extLst>
               <a:ext uri="{FF2B5EF4-FFF2-40B4-BE49-F238E27FC236}">
-                <a16:creationId xmlns:a16="http://schemas.microsoft.com/office/drawing/2014/main" id="{29349700-1736-3B6D-389B-94FDDE6F23D4}"/>
+                <a16:creationId xmlns:a16="http://schemas.microsoft.com/office/drawing/2014/main" id="{A61429E7-1EB2-ED46-3C97-23C56245FF8A}"/>
               </a:ext>
             </a:extLst>
           </p:cNvPr>
           <p:cNvPicPr>
-            <a:picLocks/>
+            <a:picLocks noChangeAspect="1"/>
           </p:cNvPicPr>
           <p:nvPr/>
         </p:nvPicPr>
-        <p:blipFill rotWithShape="1">
-          <a:blip r:embed="rId2"/>
-          <a:srcRect l="4616" r="6528"/>
-          <a:stretch/>
+        <p:blipFill>
+          <a:blip r:embed="rId2">
+            <a:extLst>
+              <a:ext uri="{28A0092B-C50C-407E-A947-70E740481C1C}">
+                <a14:useLocalDpi xmlns:a14="http://schemas.microsoft.com/office/drawing/2010/main" val="0"/>
+              </a:ext>
+            </a:extLst>
+          </a:blip>
+          <a:stretch>
+            <a:fillRect/>
+          </a:stretch>
         </p:blipFill>
         <p:spPr>
           <a:xfrm>
-            <a:off x="6096000" y="2495149"/>
-            <a:ext cx="5669280" cy="2488335"/>
+            <a:off x="5944724" y="1874517"/>
+            <a:ext cx="5809724" cy="4149803"/>
           </a:xfrm>
-          <a:prstGeom prst="roundRect">
-            <a:avLst>
-              <a:gd name="adj" fmla="val 8594"/>
-            </a:avLst>
+          <a:prstGeom prst="rect">
+            <a:avLst/>
           </a:prstGeom>
-          <a:solidFill>
-            <a:srgbClr val="FFFFFF">
-              <a:shade val="85000"/>
-            </a:srgbClr>
-          </a:solidFill>
           <a:ln>
             <a:noFill/>
           </a:ln>
           <a:effectLst>
-            <a:reflection blurRad="12700" stA="38000" endPos="28000" dist="5000" dir="5400000" sy="-100000" algn="bl" rotWithShape="0"/>
+            <a:outerShdw blurRad="292100" dist="139700" dir="2700000" algn="tl" rotWithShape="0">
+              <a:srgbClr val="333333">
+                <a:alpha val="65000"/>
+              </a:srgbClr>
+            </a:outerShdw>
           </a:effectLst>
         </p:spPr>
       </p:pic>
-      <p:cxnSp>
-        <p:nvCxnSpPr>
-          <p:cNvPr id="8" name="Съединител &quot;права стрелка&quot; 7">
-            <a:extLst>
-              <a:ext uri="{FF2B5EF4-FFF2-40B4-BE49-F238E27FC236}">
-                <a16:creationId xmlns:a16="http://schemas.microsoft.com/office/drawing/2014/main" id="{AC950C0F-E28F-225B-CA4F-53ACE7A9AE3B}"/>
-              </a:ext>
-            </a:extLst>
-          </p:cNvPr>
-          <p:cNvCxnSpPr>
-            <a:cxnSpLocks/>
-          </p:cNvCxnSpPr>
-          <p:nvPr/>
-        </p:nvCxnSpPr>
-        <p:spPr>
-          <a:xfrm flipV="1">
-            <a:off x="5605780" y="2921000"/>
-            <a:ext cx="309880" cy="457200"/>
-          </a:xfrm>
-          <a:prstGeom prst="straightConnector1">
-            <a:avLst/>
-          </a:prstGeom>
-          <a:ln w="19050">
-            <a:tailEnd type="triangle"/>
-          </a:ln>
-        </p:spPr>
-        <p:style>
-          <a:lnRef idx="2">
-            <a:schemeClr val="accent1"/>
-          </a:lnRef>
-          <a:fillRef idx="0">
-            <a:schemeClr val="accent1"/>
-          </a:fillRef>
-          <a:effectRef idx="1">
-            <a:schemeClr val="accent1"/>
-          </a:effectRef>
-          <a:fontRef idx="minor">
-            <a:schemeClr val="tx1"/>
-          </a:fontRef>
-        </p:style>
-      </p:cxnSp>
     </p:spTree>
     <p:extLst>
       <p:ext uri="{BB962C8B-B14F-4D97-AF65-F5344CB8AC3E}">
@@ -14399,6 +14410,133 @@
   <p:clrMapOvr>
     <a:masterClrMapping/>
   </p:clrMapOvr>
+  <p:transition spd="slow">
+    <p:push dir="u"/>
+  </p:transition>
+  <p:timing>
+    <p:tnLst>
+      <p:par>
+        <p:cTn id="1" dur="indefinite" restart="never" nodeType="tmRoot">
+          <p:childTnLst>
+            <p:seq concurrent="1" nextAc="seek">
+              <p:cTn id="2" dur="indefinite" nodeType="mainSeq">
+                <p:childTnLst>
+                  <p:par>
+                    <p:cTn id="3" fill="hold">
+                      <p:stCondLst>
+                        <p:cond delay="indefinite"/>
+                        <p:cond evt="onBegin" delay="0">
+                          <p:tn val="2"/>
+                        </p:cond>
+                      </p:stCondLst>
+                      <p:childTnLst>
+                        <p:par>
+                          <p:cTn id="4" fill="hold">
+                            <p:stCondLst>
+                              <p:cond delay="0"/>
+                            </p:stCondLst>
+                            <p:childTnLst>
+                              <p:par>
+                                <p:cTn id="5" presetID="2" presetClass="entr" presetSubtype="4" fill="hold" nodeType="afterEffect">
+                                  <p:stCondLst>
+                                    <p:cond delay="0"/>
+                                  </p:stCondLst>
+                                  <p:childTnLst>
+                                    <p:set>
+                                      <p:cBhvr>
+                                        <p:cTn id="6" dur="1" fill="hold">
+                                          <p:stCondLst>
+                                            <p:cond delay="0"/>
+                                          </p:stCondLst>
+                                        </p:cTn>
+                                        <p:tgtEl>
+                                          <p:spTgt spid="13"/>
+                                        </p:tgtEl>
+                                        <p:attrNameLst>
+                                          <p:attrName>style.visibility</p:attrName>
+                                        </p:attrNameLst>
+                                      </p:cBhvr>
+                                      <p:to>
+                                        <p:strVal val="visible"/>
+                                      </p:to>
+                                    </p:set>
+                                    <p:anim calcmode="lin" valueType="num">
+                                      <p:cBhvr additive="base">
+                                        <p:cTn id="7" dur="500" fill="hold"/>
+                                        <p:tgtEl>
+                                          <p:spTgt spid="13"/>
+                                        </p:tgtEl>
+                                        <p:attrNameLst>
+                                          <p:attrName>ppt_x</p:attrName>
+                                        </p:attrNameLst>
+                                      </p:cBhvr>
+                                      <p:tavLst>
+                                        <p:tav tm="0">
+                                          <p:val>
+                                            <p:strVal val="#ppt_x"/>
+                                          </p:val>
+                                        </p:tav>
+                                        <p:tav tm="100000">
+                                          <p:val>
+                                            <p:strVal val="#ppt_x"/>
+                                          </p:val>
+                                        </p:tav>
+                                      </p:tavLst>
+                                    </p:anim>
+                                    <p:anim calcmode="lin" valueType="num">
+                                      <p:cBhvr additive="base">
+                                        <p:cTn id="8" dur="500" fill="hold"/>
+                                        <p:tgtEl>
+                                          <p:spTgt spid="13"/>
+                                        </p:tgtEl>
+                                        <p:attrNameLst>
+                                          <p:attrName>ppt_y</p:attrName>
+                                        </p:attrNameLst>
+                                      </p:cBhvr>
+                                      <p:tavLst>
+                                        <p:tav tm="0">
+                                          <p:val>
+                                            <p:strVal val="1+#ppt_h/2"/>
+                                          </p:val>
+                                        </p:tav>
+                                        <p:tav tm="100000">
+                                          <p:val>
+                                            <p:strVal val="#ppt_y"/>
+                                          </p:val>
+                                        </p:tav>
+                                      </p:tavLst>
+                                    </p:anim>
+                                  </p:childTnLst>
+                                </p:cTn>
+                              </p:par>
+                            </p:childTnLst>
+                          </p:cTn>
+                        </p:par>
+                      </p:childTnLst>
+                    </p:cTn>
+                  </p:par>
+                </p:childTnLst>
+              </p:cTn>
+              <p:prevCondLst>
+                <p:cond evt="onPrev" delay="0">
+                  <p:tgtEl>
+                    <p:sldTgt/>
+                  </p:tgtEl>
+                </p:cond>
+              </p:prevCondLst>
+              <p:nextCondLst>
+                <p:cond evt="onNext" delay="0">
+                  <p:tgtEl>
+                    <p:sldTgt/>
+                  </p:tgtEl>
+                </p:cond>
+              </p:nextCondLst>
+            </p:seq>
+          </p:childTnLst>
+        </p:cTn>
+      </p:par>
+    </p:tnLst>
+  </p:timing>
 </p:sld>
 </file>
 
@@ -14831,12 +14969,12 @@
                         </a:spcAft>
                       </a:pPr>
                       <a:r>
-                        <a:rPr lang="bg-BG" sz="1100">
+                        <a:rPr lang="bg-BG" sz="1100" dirty="0">
                           <a:effectLst/>
                         </a:rPr>
                         <a:t>Всички</a:t>
                       </a:r>
-                      <a:endParaRPr lang="bg-BG" sz="1100">
+                      <a:endParaRPr lang="bg-BG" sz="1100" dirty="0">
                         <a:effectLst/>
                         <a:latin typeface="Calibri" panose="020F0502020204030204" pitchFamily="34" charset="0"/>
                         <a:ea typeface="Calibri" panose="020F0502020204030204" pitchFamily="34" charset="0"/>
@@ -15947,6 +16085,142 @@
   <p:clrMapOvr>
     <a:masterClrMapping/>
   </p:clrMapOvr>
+  <mc:AlternateContent xmlns:mc="http://schemas.openxmlformats.org/markup-compatibility/2006">
+    <mc:Choice xmlns:p14="http://schemas.microsoft.com/office/powerpoint/2010/main" Requires="p14">
+      <p:transition spd="slow" p14:dur="1250">
+        <p14:reveal/>
+      </p:transition>
+    </mc:Choice>
+    <mc:Fallback>
+      <p:transition spd="slow">
+        <p:fade/>
+      </p:transition>
+    </mc:Fallback>
+  </mc:AlternateContent>
+  <p:timing>
+    <p:tnLst>
+      <p:par>
+        <p:cTn id="1" dur="indefinite" restart="never" nodeType="tmRoot">
+          <p:childTnLst>
+            <p:seq concurrent="1" nextAc="seek">
+              <p:cTn id="2" dur="indefinite" nodeType="mainSeq">
+                <p:childTnLst>
+                  <p:par>
+                    <p:cTn id="3" fill="hold">
+                      <p:stCondLst>
+                        <p:cond delay="indefinite"/>
+                        <p:cond evt="onBegin" delay="0">
+                          <p:tn val="2"/>
+                        </p:cond>
+                      </p:stCondLst>
+                      <p:childTnLst>
+                        <p:par>
+                          <p:cTn id="4" fill="hold">
+                            <p:stCondLst>
+                              <p:cond delay="0"/>
+                            </p:stCondLst>
+                            <p:childTnLst>
+                              <p:par>
+                                <p:cTn id="5" presetID="2" presetClass="entr" presetSubtype="1" fill="hold" nodeType="afterEffect">
+                                  <p:stCondLst>
+                                    <p:cond delay="0"/>
+                                  </p:stCondLst>
+                                  <p:childTnLst>
+                                    <p:set>
+                                      <p:cBhvr>
+                                        <p:cTn id="6" dur="1" fill="hold">
+                                          <p:stCondLst>
+                                            <p:cond delay="0"/>
+                                          </p:stCondLst>
+                                        </p:cTn>
+                                        <p:tgtEl>
+                                          <p:spTgt spid="9"/>
+                                        </p:tgtEl>
+                                        <p:attrNameLst>
+                                          <p:attrName>style.visibility</p:attrName>
+                                        </p:attrNameLst>
+                                      </p:cBhvr>
+                                      <p:to>
+                                        <p:strVal val="visible"/>
+                                      </p:to>
+                                    </p:set>
+                                    <p:anim calcmode="lin" valueType="num">
+                                      <p:cBhvr additive="base">
+                                        <p:cTn id="7" dur="500" fill="hold"/>
+                                        <p:tgtEl>
+                                          <p:spTgt spid="9"/>
+                                        </p:tgtEl>
+                                        <p:attrNameLst>
+                                          <p:attrName>ppt_x</p:attrName>
+                                        </p:attrNameLst>
+                                      </p:cBhvr>
+                                      <p:tavLst>
+                                        <p:tav tm="0">
+                                          <p:val>
+                                            <p:strVal val="#ppt_x"/>
+                                          </p:val>
+                                        </p:tav>
+                                        <p:tav tm="100000">
+                                          <p:val>
+                                            <p:strVal val="#ppt_x"/>
+                                          </p:val>
+                                        </p:tav>
+                                      </p:tavLst>
+                                    </p:anim>
+                                    <p:anim calcmode="lin" valueType="num">
+                                      <p:cBhvr additive="base">
+                                        <p:cTn id="8" dur="500" fill="hold"/>
+                                        <p:tgtEl>
+                                          <p:spTgt spid="9"/>
+                                        </p:tgtEl>
+                                        <p:attrNameLst>
+                                          <p:attrName>ppt_y</p:attrName>
+                                        </p:attrNameLst>
+                                      </p:cBhvr>
+                                      <p:tavLst>
+                                        <p:tav tm="0">
+                                          <p:val>
+                                            <p:strVal val="0-#ppt_h/2"/>
+                                          </p:val>
+                                        </p:tav>
+                                        <p:tav tm="100000">
+                                          <p:val>
+                                            <p:strVal val="#ppt_y"/>
+                                          </p:val>
+                                        </p:tav>
+                                      </p:tavLst>
+                                    </p:anim>
+                                  </p:childTnLst>
+                                </p:cTn>
+                              </p:par>
+                            </p:childTnLst>
+                          </p:cTn>
+                        </p:par>
+                      </p:childTnLst>
+                    </p:cTn>
+                  </p:par>
+                </p:childTnLst>
+              </p:cTn>
+              <p:prevCondLst>
+                <p:cond evt="onPrev" delay="0">
+                  <p:tgtEl>
+                    <p:sldTgt/>
+                  </p:tgtEl>
+                </p:cond>
+              </p:prevCondLst>
+              <p:nextCondLst>
+                <p:cond evt="onNext" delay="0">
+                  <p:tgtEl>
+                    <p:sldTgt/>
+                  </p:tgtEl>
+                </p:cond>
+              </p:nextCondLst>
+            </p:seq>
+          </p:childTnLst>
+        </p:cTn>
+      </p:par>
+    </p:tnLst>
+  </p:timing>
 </p:sld>
 </file>
 
@@ -16190,6 +16464,526 @@
   <p:clrMapOvr>
     <a:masterClrMapping/>
   </p:clrMapOvr>
+  <mc:AlternateContent xmlns:mc="http://schemas.openxmlformats.org/markup-compatibility/2006">
+    <mc:Choice xmlns:p14="http://schemas.microsoft.com/office/powerpoint/2010/main" Requires="p14">
+      <p:transition spd="slow" p14:dur="1600">
+        <p14:prism isContent="1" isInverted="1"/>
+      </p:transition>
+    </mc:Choice>
+    <mc:Fallback>
+      <p:transition spd="slow">
+        <p:fade/>
+      </p:transition>
+    </mc:Fallback>
+  </mc:AlternateContent>
+  <p:timing>
+    <p:tnLst>
+      <p:par>
+        <p:cTn id="1" dur="indefinite" restart="never" nodeType="tmRoot">
+          <p:childTnLst>
+            <p:seq concurrent="1" nextAc="seek">
+              <p:cTn id="2" dur="indefinite" nodeType="mainSeq">
+                <p:childTnLst>
+                  <p:par>
+                    <p:cTn id="3" fill="hold">
+                      <p:stCondLst>
+                        <p:cond delay="indefinite"/>
+                        <p:cond evt="onBegin" delay="0">
+                          <p:tn val="2"/>
+                        </p:cond>
+                      </p:stCondLst>
+                      <p:childTnLst>
+                        <p:par>
+                          <p:cTn id="4" fill="hold">
+                            <p:stCondLst>
+                              <p:cond delay="0"/>
+                            </p:stCondLst>
+                            <p:childTnLst>
+                              <p:par>
+                                <p:cTn id="5" presetID="16" presetClass="entr" presetSubtype="21" fill="hold" grpId="0" nodeType="afterEffect">
+                                  <p:stCondLst>
+                                    <p:cond delay="0"/>
+                                  </p:stCondLst>
+                                  <p:childTnLst>
+                                    <p:set>
+                                      <p:cBhvr>
+                                        <p:cTn id="6" dur="1" fill="hold">
+                                          <p:stCondLst>
+                                            <p:cond delay="0"/>
+                                          </p:stCondLst>
+                                        </p:cTn>
+                                        <p:tgtEl>
+                                          <p:spTgt spid="7">
+                                            <p:graphicEl>
+                                              <a:dgm id="{6B39755B-A52C-47BC-8306-ED21DBD523BA}"/>
+                                            </p:graphicEl>
+                                          </p:spTgt>
+                                        </p:tgtEl>
+                                        <p:attrNameLst>
+                                          <p:attrName>style.visibility</p:attrName>
+                                        </p:attrNameLst>
+                                      </p:cBhvr>
+                                      <p:to>
+                                        <p:strVal val="visible"/>
+                                      </p:to>
+                                    </p:set>
+                                    <p:animEffect transition="in" filter="barn(inVertical)">
+                                      <p:cBhvr>
+                                        <p:cTn id="7" dur="500"/>
+                                        <p:tgtEl>
+                                          <p:spTgt spid="7">
+                                            <p:graphicEl>
+                                              <a:dgm id="{6B39755B-A52C-47BC-8306-ED21DBD523BA}"/>
+                                            </p:graphicEl>
+                                          </p:spTgt>
+                                        </p:tgtEl>
+                                      </p:cBhvr>
+                                    </p:animEffect>
+                                  </p:childTnLst>
+                                </p:cTn>
+                              </p:par>
+                              <p:par>
+                                <p:cTn id="8" presetID="16" presetClass="entr" presetSubtype="21" fill="hold" grpId="0" nodeType="withEffect">
+                                  <p:stCondLst>
+                                    <p:cond delay="0"/>
+                                  </p:stCondLst>
+                                  <p:childTnLst>
+                                    <p:set>
+                                      <p:cBhvr>
+                                        <p:cTn id="9" dur="1" fill="hold">
+                                          <p:stCondLst>
+                                            <p:cond delay="0"/>
+                                          </p:stCondLst>
+                                        </p:cTn>
+                                        <p:tgtEl>
+                                          <p:spTgt spid="7">
+                                            <p:graphicEl>
+                                              <a:dgm id="{BCABBE8F-EC13-4E36-9754-209DE7AD0464}"/>
+                                            </p:graphicEl>
+                                          </p:spTgt>
+                                        </p:tgtEl>
+                                        <p:attrNameLst>
+                                          <p:attrName>style.visibility</p:attrName>
+                                        </p:attrNameLst>
+                                      </p:cBhvr>
+                                      <p:to>
+                                        <p:strVal val="visible"/>
+                                      </p:to>
+                                    </p:set>
+                                    <p:animEffect transition="in" filter="barn(inVertical)">
+                                      <p:cBhvr>
+                                        <p:cTn id="10" dur="500"/>
+                                        <p:tgtEl>
+                                          <p:spTgt spid="7">
+                                            <p:graphicEl>
+                                              <a:dgm id="{BCABBE8F-EC13-4E36-9754-209DE7AD0464}"/>
+                                            </p:graphicEl>
+                                          </p:spTgt>
+                                        </p:tgtEl>
+                                      </p:cBhvr>
+                                    </p:animEffect>
+                                  </p:childTnLst>
+                                </p:cTn>
+                              </p:par>
+                            </p:childTnLst>
+                          </p:cTn>
+                        </p:par>
+                        <p:par>
+                          <p:cTn id="11" fill="hold">
+                            <p:stCondLst>
+                              <p:cond delay="500"/>
+                            </p:stCondLst>
+                            <p:childTnLst>
+                              <p:par>
+                                <p:cTn id="12" presetID="16" presetClass="entr" presetSubtype="21" fill="hold" grpId="0" nodeType="afterEffect">
+                                  <p:stCondLst>
+                                    <p:cond delay="0"/>
+                                  </p:stCondLst>
+                                  <p:childTnLst>
+                                    <p:set>
+                                      <p:cBhvr>
+                                        <p:cTn id="13" dur="1" fill="hold">
+                                          <p:stCondLst>
+                                            <p:cond delay="0"/>
+                                          </p:stCondLst>
+                                        </p:cTn>
+                                        <p:tgtEl>
+                                          <p:spTgt spid="7">
+                                            <p:graphicEl>
+                                              <a:dgm id="{E23B7167-76A0-4936-AD22-6E0B4A85252D}"/>
+                                            </p:graphicEl>
+                                          </p:spTgt>
+                                        </p:tgtEl>
+                                        <p:attrNameLst>
+                                          <p:attrName>style.visibility</p:attrName>
+                                        </p:attrNameLst>
+                                      </p:cBhvr>
+                                      <p:to>
+                                        <p:strVal val="visible"/>
+                                      </p:to>
+                                    </p:set>
+                                    <p:animEffect transition="in" filter="barn(inVertical)">
+                                      <p:cBhvr>
+                                        <p:cTn id="14" dur="500"/>
+                                        <p:tgtEl>
+                                          <p:spTgt spid="7">
+                                            <p:graphicEl>
+                                              <a:dgm id="{E23B7167-76A0-4936-AD22-6E0B4A85252D}"/>
+                                            </p:graphicEl>
+                                          </p:spTgt>
+                                        </p:tgtEl>
+                                      </p:cBhvr>
+                                    </p:animEffect>
+                                  </p:childTnLst>
+                                </p:cTn>
+                              </p:par>
+                            </p:childTnLst>
+                          </p:cTn>
+                        </p:par>
+                        <p:par>
+                          <p:cTn id="15" fill="hold">
+                            <p:stCondLst>
+                              <p:cond delay="1000"/>
+                            </p:stCondLst>
+                            <p:childTnLst>
+                              <p:par>
+                                <p:cTn id="16" presetID="16" presetClass="entr" presetSubtype="21" fill="hold" grpId="0" nodeType="afterEffect">
+                                  <p:stCondLst>
+                                    <p:cond delay="0"/>
+                                  </p:stCondLst>
+                                  <p:childTnLst>
+                                    <p:set>
+                                      <p:cBhvr>
+                                        <p:cTn id="17" dur="1" fill="hold">
+                                          <p:stCondLst>
+                                            <p:cond delay="0"/>
+                                          </p:stCondLst>
+                                        </p:cTn>
+                                        <p:tgtEl>
+                                          <p:spTgt spid="7">
+                                            <p:graphicEl>
+                                              <a:dgm id="{2CFA9D06-93B7-44EA-A194-1E1D68DD304B}"/>
+                                            </p:graphicEl>
+                                          </p:spTgt>
+                                        </p:tgtEl>
+                                        <p:attrNameLst>
+                                          <p:attrName>style.visibility</p:attrName>
+                                        </p:attrNameLst>
+                                      </p:cBhvr>
+                                      <p:to>
+                                        <p:strVal val="visible"/>
+                                      </p:to>
+                                    </p:set>
+                                    <p:animEffect transition="in" filter="barn(inVertical)">
+                                      <p:cBhvr>
+                                        <p:cTn id="18" dur="500"/>
+                                        <p:tgtEl>
+                                          <p:spTgt spid="7">
+                                            <p:graphicEl>
+                                              <a:dgm id="{2CFA9D06-93B7-44EA-A194-1E1D68DD304B}"/>
+                                            </p:graphicEl>
+                                          </p:spTgt>
+                                        </p:tgtEl>
+                                      </p:cBhvr>
+                                    </p:animEffect>
+                                  </p:childTnLst>
+                                </p:cTn>
+                              </p:par>
+                            </p:childTnLst>
+                          </p:cTn>
+                        </p:par>
+                        <p:par>
+                          <p:cTn id="19" fill="hold">
+                            <p:stCondLst>
+                              <p:cond delay="1500"/>
+                            </p:stCondLst>
+                            <p:childTnLst>
+                              <p:par>
+                                <p:cTn id="20" presetID="16" presetClass="entr" presetSubtype="21" fill="hold" grpId="0" nodeType="afterEffect">
+                                  <p:stCondLst>
+                                    <p:cond delay="0"/>
+                                  </p:stCondLst>
+                                  <p:childTnLst>
+                                    <p:set>
+                                      <p:cBhvr>
+                                        <p:cTn id="21" dur="1" fill="hold">
+                                          <p:stCondLst>
+                                            <p:cond delay="0"/>
+                                          </p:stCondLst>
+                                        </p:cTn>
+                                        <p:tgtEl>
+                                          <p:spTgt spid="7">
+                                            <p:graphicEl>
+                                              <a:dgm id="{4E6C7E05-00FA-4DA9-A289-47DDD64ED679}"/>
+                                            </p:graphicEl>
+                                          </p:spTgt>
+                                        </p:tgtEl>
+                                        <p:attrNameLst>
+                                          <p:attrName>style.visibility</p:attrName>
+                                        </p:attrNameLst>
+                                      </p:cBhvr>
+                                      <p:to>
+                                        <p:strVal val="visible"/>
+                                      </p:to>
+                                    </p:set>
+                                    <p:animEffect transition="in" filter="barn(inVertical)">
+                                      <p:cBhvr>
+                                        <p:cTn id="22" dur="500"/>
+                                        <p:tgtEl>
+                                          <p:spTgt spid="7">
+                                            <p:graphicEl>
+                                              <a:dgm id="{4E6C7E05-00FA-4DA9-A289-47DDD64ED679}"/>
+                                            </p:graphicEl>
+                                          </p:spTgt>
+                                        </p:tgtEl>
+                                      </p:cBhvr>
+                                    </p:animEffect>
+                                  </p:childTnLst>
+                                </p:cTn>
+                              </p:par>
+                            </p:childTnLst>
+                          </p:cTn>
+                        </p:par>
+                        <p:par>
+                          <p:cTn id="23" fill="hold">
+                            <p:stCondLst>
+                              <p:cond delay="2000"/>
+                            </p:stCondLst>
+                            <p:childTnLst>
+                              <p:par>
+                                <p:cTn id="24" presetID="16" presetClass="entr" presetSubtype="21" fill="hold" grpId="0" nodeType="afterEffect">
+                                  <p:stCondLst>
+                                    <p:cond delay="0"/>
+                                  </p:stCondLst>
+                                  <p:childTnLst>
+                                    <p:set>
+                                      <p:cBhvr>
+                                        <p:cTn id="25" dur="1" fill="hold">
+                                          <p:stCondLst>
+                                            <p:cond delay="0"/>
+                                          </p:stCondLst>
+                                        </p:cTn>
+                                        <p:tgtEl>
+                                          <p:spTgt spid="7">
+                                            <p:graphicEl>
+                                              <a:dgm id="{CADF167D-8D33-4749-96F4-4B8EF8E60759}"/>
+                                            </p:graphicEl>
+                                          </p:spTgt>
+                                        </p:tgtEl>
+                                        <p:attrNameLst>
+                                          <p:attrName>style.visibility</p:attrName>
+                                        </p:attrNameLst>
+                                      </p:cBhvr>
+                                      <p:to>
+                                        <p:strVal val="visible"/>
+                                      </p:to>
+                                    </p:set>
+                                    <p:animEffect transition="in" filter="barn(inVertical)">
+                                      <p:cBhvr>
+                                        <p:cTn id="26" dur="500"/>
+                                        <p:tgtEl>
+                                          <p:spTgt spid="7">
+                                            <p:graphicEl>
+                                              <a:dgm id="{CADF167D-8D33-4749-96F4-4B8EF8E60759}"/>
+                                            </p:graphicEl>
+                                          </p:spTgt>
+                                        </p:tgtEl>
+                                      </p:cBhvr>
+                                    </p:animEffect>
+                                  </p:childTnLst>
+                                </p:cTn>
+                              </p:par>
+                            </p:childTnLst>
+                          </p:cTn>
+                        </p:par>
+                        <p:par>
+                          <p:cTn id="27" fill="hold">
+                            <p:stCondLst>
+                              <p:cond delay="2500"/>
+                            </p:stCondLst>
+                            <p:childTnLst>
+                              <p:par>
+                                <p:cTn id="28" presetID="16" presetClass="entr" presetSubtype="21" fill="hold" grpId="0" nodeType="afterEffect">
+                                  <p:stCondLst>
+                                    <p:cond delay="0"/>
+                                  </p:stCondLst>
+                                  <p:childTnLst>
+                                    <p:set>
+                                      <p:cBhvr>
+                                        <p:cTn id="29" dur="1" fill="hold">
+                                          <p:stCondLst>
+                                            <p:cond delay="0"/>
+                                          </p:stCondLst>
+                                        </p:cTn>
+                                        <p:tgtEl>
+                                          <p:spTgt spid="7">
+                                            <p:graphicEl>
+                                              <a:dgm id="{E248228D-6354-491E-A1EE-C068F1E92E37}"/>
+                                            </p:graphicEl>
+                                          </p:spTgt>
+                                        </p:tgtEl>
+                                        <p:attrNameLst>
+                                          <p:attrName>style.visibility</p:attrName>
+                                        </p:attrNameLst>
+                                      </p:cBhvr>
+                                      <p:to>
+                                        <p:strVal val="visible"/>
+                                      </p:to>
+                                    </p:set>
+                                    <p:animEffect transition="in" filter="barn(inVertical)">
+                                      <p:cBhvr>
+                                        <p:cTn id="30" dur="500"/>
+                                        <p:tgtEl>
+                                          <p:spTgt spid="7">
+                                            <p:graphicEl>
+                                              <a:dgm id="{E248228D-6354-491E-A1EE-C068F1E92E37}"/>
+                                            </p:graphicEl>
+                                          </p:spTgt>
+                                        </p:tgtEl>
+                                      </p:cBhvr>
+                                    </p:animEffect>
+                                  </p:childTnLst>
+                                </p:cTn>
+                              </p:par>
+                            </p:childTnLst>
+                          </p:cTn>
+                        </p:par>
+                        <p:par>
+                          <p:cTn id="31" fill="hold">
+                            <p:stCondLst>
+                              <p:cond delay="3000"/>
+                            </p:stCondLst>
+                            <p:childTnLst>
+                              <p:par>
+                                <p:cTn id="32" presetID="16" presetClass="entr" presetSubtype="21" fill="hold" grpId="0" nodeType="afterEffect">
+                                  <p:stCondLst>
+                                    <p:cond delay="0"/>
+                                  </p:stCondLst>
+                                  <p:childTnLst>
+                                    <p:set>
+                                      <p:cBhvr>
+                                        <p:cTn id="33" dur="1" fill="hold">
+                                          <p:stCondLst>
+                                            <p:cond delay="0"/>
+                                          </p:stCondLst>
+                                        </p:cTn>
+                                        <p:tgtEl>
+                                          <p:spTgt spid="7">
+                                            <p:graphicEl>
+                                              <a:dgm id="{DEFCE8B3-BAD4-4B61-BBA8-B062498AB058}"/>
+                                            </p:graphicEl>
+                                          </p:spTgt>
+                                        </p:tgtEl>
+                                        <p:attrNameLst>
+                                          <p:attrName>style.visibility</p:attrName>
+                                        </p:attrNameLst>
+                                      </p:cBhvr>
+                                      <p:to>
+                                        <p:strVal val="visible"/>
+                                      </p:to>
+                                    </p:set>
+                                    <p:animEffect transition="in" filter="barn(inVertical)">
+                                      <p:cBhvr>
+                                        <p:cTn id="34" dur="500"/>
+                                        <p:tgtEl>
+                                          <p:spTgt spid="7">
+                                            <p:graphicEl>
+                                              <a:dgm id="{DEFCE8B3-BAD4-4B61-BBA8-B062498AB058}"/>
+                                            </p:graphicEl>
+                                          </p:spTgt>
+                                        </p:tgtEl>
+                                      </p:cBhvr>
+                                    </p:animEffect>
+                                  </p:childTnLst>
+                                </p:cTn>
+                              </p:par>
+                            </p:childTnLst>
+                          </p:cTn>
+                        </p:par>
+                        <p:par>
+                          <p:cTn id="35" fill="hold">
+                            <p:stCondLst>
+                              <p:cond delay="3500"/>
+                            </p:stCondLst>
+                            <p:childTnLst>
+                              <p:par>
+                                <p:cTn id="36" presetID="16" presetClass="entr" presetSubtype="21" fill="hold" grpId="0" nodeType="afterEffect">
+                                  <p:stCondLst>
+                                    <p:cond delay="0"/>
+                                  </p:stCondLst>
+                                  <p:childTnLst>
+                                    <p:set>
+                                      <p:cBhvr>
+                                        <p:cTn id="37" dur="1" fill="hold">
+                                          <p:stCondLst>
+                                            <p:cond delay="0"/>
+                                          </p:stCondLst>
+                                        </p:cTn>
+                                        <p:tgtEl>
+                                          <p:spTgt spid="7">
+                                            <p:graphicEl>
+                                              <a:dgm id="{324F481E-1307-442A-A5BA-CCDBA0E91FCA}"/>
+                                            </p:graphicEl>
+                                          </p:spTgt>
+                                        </p:tgtEl>
+                                        <p:attrNameLst>
+                                          <p:attrName>style.visibility</p:attrName>
+                                        </p:attrNameLst>
+                                      </p:cBhvr>
+                                      <p:to>
+                                        <p:strVal val="visible"/>
+                                      </p:to>
+                                    </p:set>
+                                    <p:animEffect transition="in" filter="barn(inVertical)">
+                                      <p:cBhvr>
+                                        <p:cTn id="38" dur="500"/>
+                                        <p:tgtEl>
+                                          <p:spTgt spid="7">
+                                            <p:graphicEl>
+                                              <a:dgm id="{324F481E-1307-442A-A5BA-CCDBA0E91FCA}"/>
+                                            </p:graphicEl>
+                                          </p:spTgt>
+                                        </p:tgtEl>
+                                      </p:cBhvr>
+                                    </p:animEffect>
+                                  </p:childTnLst>
+                                </p:cTn>
+                              </p:par>
+                            </p:childTnLst>
+                          </p:cTn>
+                        </p:par>
+                      </p:childTnLst>
+                    </p:cTn>
+                  </p:par>
+                </p:childTnLst>
+              </p:cTn>
+              <p:prevCondLst>
+                <p:cond evt="onPrev" delay="0">
+                  <p:tgtEl>
+                    <p:sldTgt/>
+                  </p:tgtEl>
+                </p:cond>
+              </p:prevCondLst>
+              <p:nextCondLst>
+                <p:cond evt="onNext" delay="0">
+                  <p:tgtEl>
+                    <p:sldTgt/>
+                  </p:tgtEl>
+                </p:cond>
+              </p:nextCondLst>
+            </p:seq>
+          </p:childTnLst>
+        </p:cTn>
+      </p:par>
+    </p:tnLst>
+    <p:bldLst>
+      <p:bldGraphic spid="7" grpId="0" uiExpand="1">
+        <p:bldSub>
+          <a:bldDgm bld="one"/>
+        </p:bldSub>
+      </p:bldGraphic>
+    </p:bldLst>
+  </p:timing>
 </p:sld>
 </file>
 
@@ -16499,6 +17293,148 @@
   <p:clrMapOvr>
     <a:masterClrMapping/>
   </p:clrMapOvr>
+  <mc:AlternateContent xmlns:mc="http://schemas.openxmlformats.org/markup-compatibility/2006">
+    <mc:Choice xmlns:p14="http://schemas.microsoft.com/office/powerpoint/2010/main" Requires="p14">
+      <p:transition spd="slow" p14:dur="800">
+        <p:circle/>
+      </p:transition>
+    </mc:Choice>
+    <mc:Fallback>
+      <p:transition spd="slow">
+        <p:circle/>
+      </p:transition>
+    </mc:Fallback>
+  </mc:AlternateContent>
+  <p:timing>
+    <p:tnLst>
+      <p:par>
+        <p:cTn id="1" dur="indefinite" restart="never" nodeType="tmRoot">
+          <p:childTnLst>
+            <p:seq concurrent="1" nextAc="seek">
+              <p:cTn id="2" dur="indefinite" nodeType="mainSeq">
+                <p:childTnLst>
+                  <p:par>
+                    <p:cTn id="3" fill="hold">
+                      <p:stCondLst>
+                        <p:cond delay="indefinite"/>
+                        <p:cond evt="onBegin" delay="0">
+                          <p:tn val="2"/>
+                        </p:cond>
+                      </p:stCondLst>
+                      <p:childTnLst>
+                        <p:par>
+                          <p:cTn id="4" fill="hold">
+                            <p:stCondLst>
+                              <p:cond delay="0"/>
+                            </p:stCondLst>
+                            <p:childTnLst>
+                              <p:par>
+                                <p:cTn id="5" presetID="22" presetClass="entr" presetSubtype="4" fill="hold" nodeType="afterEffect">
+                                  <p:stCondLst>
+                                    <p:cond delay="0"/>
+                                  </p:stCondLst>
+                                  <p:childTnLst>
+                                    <p:set>
+                                      <p:cBhvr>
+                                        <p:cTn id="6" dur="1" fill="hold">
+                                          <p:stCondLst>
+                                            <p:cond delay="0"/>
+                                          </p:stCondLst>
+                                        </p:cTn>
+                                        <p:tgtEl>
+                                          <p:spTgt spid="17"/>
+                                        </p:tgtEl>
+                                        <p:attrNameLst>
+                                          <p:attrName>style.visibility</p:attrName>
+                                        </p:attrNameLst>
+                                      </p:cBhvr>
+                                      <p:to>
+                                        <p:strVal val="visible"/>
+                                      </p:to>
+                                    </p:set>
+                                    <p:animEffect transition="in" filter="wipe(down)">
+                                      <p:cBhvr>
+                                        <p:cTn id="7" dur="500"/>
+                                        <p:tgtEl>
+                                          <p:spTgt spid="17"/>
+                                        </p:tgtEl>
+                                      </p:cBhvr>
+                                    </p:animEffect>
+                                  </p:childTnLst>
+                                </p:cTn>
+                              </p:par>
+                            </p:childTnLst>
+                          </p:cTn>
+                        </p:par>
+                        <p:par>
+                          <p:cTn id="8" fill="hold">
+                            <p:stCondLst>
+                              <p:cond delay="500"/>
+                            </p:stCondLst>
+                            <p:childTnLst>
+                              <p:par>
+                                <p:cTn id="9" presetID="22" presetClass="entr" presetSubtype="1" fill="hold" nodeType="afterEffect">
+                                  <p:stCondLst>
+                                    <p:cond delay="250"/>
+                                  </p:stCondLst>
+                                  <p:childTnLst>
+                                    <p:set>
+                                      <p:cBhvr>
+                                        <p:cTn id="10" dur="1" fill="hold">
+                                          <p:stCondLst>
+                                            <p:cond delay="0"/>
+                                          </p:stCondLst>
+                                        </p:cTn>
+                                        <p:tgtEl>
+                                          <p:spTgt spid="11"/>
+                                        </p:tgtEl>
+                                        <p:attrNameLst>
+                                          <p:attrName>style.visibility</p:attrName>
+                                        </p:attrNameLst>
+                                      </p:cBhvr>
+                                      <p:to>
+                                        <p:strVal val="visible"/>
+                                      </p:to>
+                                    </p:set>
+                                    <p:animEffect transition="in" filter="wipe(up)">
+                                      <p:cBhvr>
+                                        <p:cTn id="11" dur="500"/>
+                                        <p:tgtEl>
+                                          <p:spTgt spid="11"/>
+                                        </p:tgtEl>
+                                      </p:cBhvr>
+                                    </p:animEffect>
+                                  </p:childTnLst>
+                                </p:cTn>
+                              </p:par>
+                            </p:childTnLst>
+                          </p:cTn>
+                        </p:par>
+                      </p:childTnLst>
+                    </p:cTn>
+                  </p:par>
+                </p:childTnLst>
+              </p:cTn>
+              <p:prevCondLst>
+                <p:cond evt="onPrev" delay="0">
+                  <p:tgtEl>
+                    <p:sldTgt/>
+                  </p:tgtEl>
+                </p:cond>
+              </p:prevCondLst>
+              <p:nextCondLst>
+                <p:cond evt="onNext" delay="0">
+                  <p:tgtEl>
+                    <p:sldTgt/>
+                  </p:tgtEl>
+                </p:cond>
+              </p:nextCondLst>
+            </p:seq>
+          </p:childTnLst>
+        </p:cTn>
+      </p:par>
+    </p:tnLst>
+  </p:timing>
 </p:sld>
 </file>
 
@@ -16584,6 +17520,15 @@
             <a:off x="1724969" y="1284888"/>
             <a:ext cx="9231739" cy="5190727"/>
           </a:xfrm>
+          <a:prstGeom prst="rect">
+            <a:avLst/>
+          </a:prstGeom>
+          <a:ln>
+            <a:noFill/>
+          </a:ln>
+          <a:effectLst>
+            <a:softEdge rad="112500"/>
+          </a:effectLst>
         </p:spPr>
       </p:pic>
     </p:spTree>
@@ -16596,6 +17541,95 @@
   <p:clrMapOvr>
     <a:masterClrMapping/>
   </p:clrMapOvr>
+  <p:transition spd="slow">
+    <p:push dir="u"/>
+  </p:transition>
+  <p:timing>
+    <p:tnLst>
+      <p:par>
+        <p:cTn id="1" dur="indefinite" restart="never" nodeType="tmRoot">
+          <p:childTnLst>
+            <p:seq concurrent="1" nextAc="seek">
+              <p:cTn id="2" dur="indefinite" nodeType="mainSeq">
+                <p:childTnLst>
+                  <p:par>
+                    <p:cTn id="3" fill="hold">
+                      <p:stCondLst>
+                        <p:cond delay="indefinite"/>
+                        <p:cond evt="onBegin" delay="0">
+                          <p:tn val="2"/>
+                        </p:cond>
+                      </p:stCondLst>
+                      <p:childTnLst>
+                        <p:par>
+                          <p:cTn id="4" fill="hold">
+                            <p:stCondLst>
+                              <p:cond delay="0"/>
+                            </p:stCondLst>
+                            <p:childTnLst>
+                              <p:par>
+                                <p:cTn id="5" presetID="22" presetClass="entr" presetSubtype="4" fill="hold" nodeType="afterEffect">
+                                  <p:stCondLst>
+                                    <p:cond delay="0"/>
+                                  </p:stCondLst>
+                                  <p:childTnLst>
+                                    <p:set>
+                                      <p:cBhvr>
+                                        <p:cTn id="6" dur="1" fill="hold">
+                                          <p:stCondLst>
+                                            <p:cond delay="0"/>
+                                          </p:stCondLst>
+                                        </p:cTn>
+                                        <p:tgtEl>
+                                          <p:spTgt spid="5"/>
+                                        </p:tgtEl>
+                                        <p:attrNameLst>
+                                          <p:attrName>style.visibility</p:attrName>
+                                        </p:attrNameLst>
+                                      </p:cBhvr>
+                                      <p:to>
+                                        <p:strVal val="visible"/>
+                                      </p:to>
+                                    </p:set>
+                                    <p:animEffect transition="in" filter="wipe(down)">
+                                      <p:cBhvr>
+                                        <p:cTn id="7" dur="500"/>
+                                        <p:tgtEl>
+                                          <p:spTgt spid="5"/>
+                                        </p:tgtEl>
+                                      </p:cBhvr>
+                                    </p:animEffect>
+                                  </p:childTnLst>
+                                </p:cTn>
+                              </p:par>
+                            </p:childTnLst>
+                          </p:cTn>
+                        </p:par>
+                      </p:childTnLst>
+                    </p:cTn>
+                  </p:par>
+                </p:childTnLst>
+              </p:cTn>
+              <p:prevCondLst>
+                <p:cond evt="onPrev" delay="0">
+                  <p:tgtEl>
+                    <p:sldTgt/>
+                  </p:tgtEl>
+                </p:cond>
+              </p:prevCondLst>
+              <p:nextCondLst>
+                <p:cond evt="onNext" delay="0">
+                  <p:tgtEl>
+                    <p:sldTgt/>
+                  </p:tgtEl>
+                </p:cond>
+              </p:nextCondLst>
+            </p:seq>
+          </p:childTnLst>
+        </p:cTn>
+      </p:par>
+    </p:tnLst>
+  </p:timing>
 </p:sld>
 </file>
 
@@ -16694,6 +17728,18 @@
   <p:clrMapOvr>
     <a:masterClrMapping/>
   </p:clrMapOvr>
+  <mc:AlternateContent xmlns:mc="http://schemas.openxmlformats.org/markup-compatibility/2006">
+    <mc:Choice xmlns:p14="http://schemas.microsoft.com/office/powerpoint/2010/main" Requires="p14">
+      <p:transition spd="slow" p14:dur="1400">
+        <p14:doors dir="vert"/>
+      </p:transition>
+    </mc:Choice>
+    <mc:Fallback>
+      <p:transition spd="slow">
+        <p:fade/>
+      </p:transition>
+    </mc:Fallback>
+  </mc:AlternateContent>
 </p:sld>
 </file>
 
@@ -16765,7 +17811,7 @@
         <p:spPr>
           <a:xfrm>
             <a:off x="1251678" y="1691637"/>
-            <a:ext cx="9284242" cy="4257039"/>
+            <a:ext cx="8645357" cy="4257039"/>
           </a:xfrm>
         </p:spPr>
         <p:txBody>
@@ -16776,16 +17822,20 @@
               <a:buNone/>
             </a:pPr>
             <a:r>
+              <a:rPr lang="ru-RU" b="1" dirty="0"/>
+              <a:t>Система за </a:t>
+            </a:r>
+            <a:r>
+              <a:rPr lang="ru-RU" b="1" dirty="0" err="1"/>
+              <a:t>избор</a:t>
+            </a:r>
+            <a:r>
+              <a:rPr lang="ru-RU" b="1" dirty="0"/>
+              <a:t> на песен</a:t>
+            </a:r>
+            <a:r>
               <a:rPr lang="ru-RU" dirty="0"/>
-              <a:t>Система за </a:t>
-            </a:r>
-            <a:r>
-              <a:rPr lang="ru-RU" dirty="0" err="1"/>
-              <a:t>избор</a:t>
-            </a:r>
-            <a:r>
-              <a:rPr lang="ru-RU" dirty="0"/>
-              <a:t> на песен, </a:t>
+              <a:t>, </a:t>
             </a:r>
             <a:r>
               <a:rPr lang="ru-RU" dirty="0" err="1"/>
@@ -16822,12 +17872,16 @@
           </a:p>
           <a:p>
             <a:r>
-              <a:rPr lang="ru-RU" dirty="0" err="1"/>
+              <a:rPr lang="ru-RU" b="1" dirty="0" err="1"/>
               <a:t>добавяне</a:t>
             </a:r>
             <a:r>
+              <a:rPr lang="ru-RU" b="1" dirty="0"/>
+              <a:t> на информация за песен</a:t>
+            </a:r>
+            <a:r>
               <a:rPr lang="ru-RU" dirty="0"/>
-              <a:t> на информация за песен, </a:t>
+              <a:t>, </a:t>
             </a:r>
             <a:r>
               <a:rPr lang="ru-RU" dirty="0" err="1"/>
@@ -16867,76 +17921,471 @@
             </a:r>
             <a:endParaRPr lang="ru-RU" dirty="0"/>
           </a:p>
+        </p:txBody>
+      </p:sp>
+      <p:pic>
+        <p:nvPicPr>
+          <p:cNvPr id="4" name="Picture 15">
+            <a:extLst>
+              <a:ext uri="{FF2B5EF4-FFF2-40B4-BE49-F238E27FC236}">
+                <a16:creationId xmlns:a16="http://schemas.microsoft.com/office/drawing/2014/main" id="{6E45BB83-2834-F037-CF12-2D6C47D89D1C}"/>
+              </a:ext>
+            </a:extLst>
+          </p:cNvPr>
+          <p:cNvPicPr>
+            <a:picLocks noChangeAspect="1"/>
+          </p:cNvPicPr>
+          <p:nvPr/>
+        </p:nvPicPr>
+        <p:blipFill rotWithShape="1">
+          <a:blip r:embed="rId2"/>
+          <a:srcRect l="489" r="-1"/>
+          <a:stretch/>
+        </p:blipFill>
+        <p:spPr>
+          <a:xfrm>
+            <a:off x="5773270" y="2644140"/>
+            <a:ext cx="5656729" cy="3756660"/>
+          </a:xfrm>
+          <a:prstGeom prst="rect">
+            <a:avLst/>
+          </a:prstGeom>
+          <a:ln>
+            <a:noFill/>
+          </a:ln>
+          <a:effectLst>
+            <a:outerShdw blurRad="292100" dist="139700" dir="2700000" algn="tl" rotWithShape="0">
+              <a:srgbClr val="333333">
+                <a:alpha val="65000"/>
+              </a:srgbClr>
+            </a:outerShdw>
+          </a:effectLst>
+        </p:spPr>
+      </p:pic>
+      <p:sp>
+        <p:nvSpPr>
+          <p:cNvPr id="8" name="Текстово поле 7">
+            <a:extLst>
+              <a:ext uri="{FF2B5EF4-FFF2-40B4-BE49-F238E27FC236}">
+                <a16:creationId xmlns:a16="http://schemas.microsoft.com/office/drawing/2014/main" id="{7D8DA9AD-B08C-94E2-8272-E9B7DD86D35A}"/>
+              </a:ext>
+            </a:extLst>
+          </p:cNvPr>
+          <p:cNvSpPr txBox="1"/>
+          <p:nvPr/>
+        </p:nvSpPr>
+        <p:spPr>
+          <a:xfrm>
+            <a:off x="1251678" y="2856572"/>
+            <a:ext cx="4682957" cy="1429622"/>
+          </a:xfrm>
+          <a:prstGeom prst="rect">
+            <a:avLst/>
+          </a:prstGeom>
+          <a:noFill/>
+        </p:spPr>
+        <p:txBody>
+          <a:bodyPr wrap="square">
+            <a:spAutoFit/>
+          </a:bodyPr>
+          <a:lstStyle/>
           <a:p>
-            <a:r>
-              <a:rPr lang="ru-RU" dirty="0" err="1"/>
+            <a:pPr marL="228600" marR="0" lvl="0" indent="-228600" algn="l" defTabSz="914400" rtl="0" eaLnBrk="1" fontAlgn="auto" latinLnBrk="0" hangingPunct="1">
+              <a:lnSpc>
+                <a:spcPct val="110000"/>
+              </a:lnSpc>
+              <a:spcBef>
+                <a:spcPts val="700"/>
+              </a:spcBef>
+              <a:spcAft>
+                <a:spcPts val="0"/>
+              </a:spcAft>
+              <a:buClr>
+                <a:srgbClr val="252532"/>
+              </a:buClr>
+              <a:buSzTx/>
+              <a:buFont typeface="Arial" panose="020B0604020202020204" pitchFamily="34" charset="0"/>
+              <a:buChar char="•"/>
+              <a:tabLst/>
+              <a:defRPr/>
+            </a:pPr>
+            <a:r>
+              <a:rPr kumimoji="0" lang="ru-RU" sz="2000" b="1" i="0" u="none" strike="noStrike" kern="1200" cap="none" spc="0" normalizeH="0" baseline="0" noProof="0" dirty="0" err="1">
+                <a:ln>
+                  <a:noFill/>
+                </a:ln>
+                <a:solidFill>
+                  <a:prstClr val="black">
+                    <a:lumMod val="65000"/>
+                    <a:lumOff val="35000"/>
+                  </a:prstClr>
+                </a:solidFill>
+                <a:effectLst/>
+                <a:uLnTx/>
+                <a:uFillTx/>
+                <a:latin typeface="Corbel" panose="020B0503020204020204" pitchFamily="34" charset="0"/>
+                <a:ea typeface="+mn-ea"/>
+                <a:cs typeface="+mn-cs"/>
+              </a:rPr>
               <a:t>търсене</a:t>
             </a:r>
             <a:r>
-              <a:rPr lang="ru-RU" dirty="0"/>
-              <a:t> на песен по </a:t>
-            </a:r>
-            <a:r>
-              <a:rPr lang="ru-RU" dirty="0" err="1"/>
+              <a:rPr kumimoji="0" lang="ru-RU" sz="2000" b="1" i="0" u="none" strike="noStrike" kern="1200" cap="none" spc="0" normalizeH="0" baseline="0" noProof="0" dirty="0">
+                <a:ln>
+                  <a:noFill/>
+                </a:ln>
+                <a:solidFill>
+                  <a:prstClr val="black">
+                    <a:lumMod val="65000"/>
+                    <a:lumOff val="35000"/>
+                  </a:prstClr>
+                </a:solidFill>
+                <a:effectLst/>
+                <a:uLnTx/>
+                <a:uFillTx/>
+                <a:latin typeface="Corbel" panose="020B0503020204020204" pitchFamily="34" charset="0"/>
+                <a:ea typeface="+mn-ea"/>
+                <a:cs typeface="+mn-cs"/>
+              </a:rPr>
+              <a:t> на песен </a:t>
+            </a:r>
+            <a:r>
+              <a:rPr kumimoji="0" lang="ru-RU" sz="2000" b="0" i="0" u="none" strike="noStrike" kern="1200" cap="none" spc="0" normalizeH="0" baseline="0" noProof="0" dirty="0">
+                <a:ln>
+                  <a:noFill/>
+                </a:ln>
+                <a:solidFill>
+                  <a:prstClr val="black">
+                    <a:lumMod val="65000"/>
+                    <a:lumOff val="35000"/>
+                  </a:prstClr>
+                </a:solidFill>
+                <a:effectLst/>
+                <a:uLnTx/>
+                <a:uFillTx/>
+                <a:latin typeface="Corbel" panose="020B0503020204020204" pitchFamily="34" charset="0"/>
+                <a:ea typeface="+mn-ea"/>
+                <a:cs typeface="+mn-cs"/>
+              </a:rPr>
+              <a:t>по </a:t>
+            </a:r>
+            <a:r>
+              <a:rPr kumimoji="0" lang="ru-RU" sz="2000" b="0" i="0" u="none" strike="noStrike" kern="1200" cap="none" spc="0" normalizeH="0" baseline="0" noProof="0" dirty="0" err="1">
+                <a:ln>
+                  <a:noFill/>
+                </a:ln>
+                <a:solidFill>
+                  <a:prstClr val="black">
+                    <a:lumMod val="65000"/>
+                    <a:lumOff val="35000"/>
+                  </a:prstClr>
+                </a:solidFill>
+                <a:effectLst/>
+                <a:uLnTx/>
+                <a:uFillTx/>
+                <a:latin typeface="Corbel" panose="020B0503020204020204" pitchFamily="34" charset="0"/>
+                <a:ea typeface="+mn-ea"/>
+                <a:cs typeface="+mn-cs"/>
+              </a:rPr>
               <a:t>различни</a:t>
             </a:r>
             <a:r>
-              <a:rPr lang="ru-RU" dirty="0"/>
+              <a:rPr kumimoji="0" lang="ru-RU" sz="2000" b="0" i="0" u="none" strike="noStrike" kern="1200" cap="none" spc="0" normalizeH="0" baseline="0" noProof="0" dirty="0">
+                <a:ln>
+                  <a:noFill/>
+                </a:ln>
+                <a:solidFill>
+                  <a:prstClr val="black">
+                    <a:lumMod val="65000"/>
+                    <a:lumOff val="35000"/>
+                  </a:prstClr>
+                </a:solidFill>
+                <a:effectLst/>
+                <a:uLnTx/>
+                <a:uFillTx/>
+                <a:latin typeface="Corbel" panose="020B0503020204020204" pitchFamily="34" charset="0"/>
+                <a:ea typeface="+mn-ea"/>
+                <a:cs typeface="+mn-cs"/>
+              </a:rPr>
               <a:t> </a:t>
             </a:r>
             <a:r>
-              <a:rPr lang="ru-RU" dirty="0" err="1"/>
+              <a:rPr kumimoji="0" lang="ru-RU" sz="2000" b="0" i="0" u="none" strike="noStrike" kern="1200" cap="none" spc="0" normalizeH="0" baseline="0" noProof="0" dirty="0" err="1">
+                <a:ln>
+                  <a:noFill/>
+                </a:ln>
+                <a:solidFill>
+                  <a:prstClr val="black">
+                    <a:lumMod val="65000"/>
+                    <a:lumOff val="35000"/>
+                  </a:prstClr>
+                </a:solidFill>
+                <a:effectLst/>
+                <a:uLnTx/>
+                <a:uFillTx/>
+                <a:latin typeface="Corbel" panose="020B0503020204020204" pitchFamily="34" charset="0"/>
+                <a:ea typeface="+mn-ea"/>
+                <a:cs typeface="+mn-cs"/>
+              </a:rPr>
               <a:t>зададени</a:t>
             </a:r>
             <a:r>
-              <a:rPr lang="ru-RU" dirty="0"/>
+              <a:rPr kumimoji="0" lang="ru-RU" sz="2000" b="0" i="0" u="none" strike="noStrike" kern="1200" cap="none" spc="0" normalizeH="0" baseline="0" noProof="0" dirty="0">
+                <a:ln>
+                  <a:noFill/>
+                </a:ln>
+                <a:solidFill>
+                  <a:prstClr val="black">
+                    <a:lumMod val="65000"/>
+                    <a:lumOff val="35000"/>
+                  </a:prstClr>
+                </a:solidFill>
+                <a:effectLst/>
+                <a:uLnTx/>
+                <a:uFillTx/>
+                <a:latin typeface="Corbel" panose="020B0503020204020204" pitchFamily="34" charset="0"/>
+                <a:ea typeface="+mn-ea"/>
+                <a:cs typeface="+mn-cs"/>
+              </a:rPr>
               <a:t> критерии (</a:t>
             </a:r>
             <a:r>
-              <a:rPr lang="ru-RU" dirty="0" err="1"/>
+              <a:rPr kumimoji="0" lang="ru-RU" sz="2000" b="0" i="0" u="none" strike="noStrike" kern="1200" cap="none" spc="0" normalizeH="0" baseline="0" noProof="0" dirty="0" err="1">
+                <a:ln>
+                  <a:noFill/>
+                </a:ln>
+                <a:solidFill>
+                  <a:prstClr val="black">
+                    <a:lumMod val="65000"/>
+                    <a:lumOff val="35000"/>
+                  </a:prstClr>
+                </a:solidFill>
+                <a:effectLst/>
+                <a:uLnTx/>
+                <a:uFillTx/>
+                <a:latin typeface="Corbel" panose="020B0503020204020204" pitchFamily="34" charset="0"/>
+                <a:ea typeface="+mn-ea"/>
+                <a:cs typeface="+mn-cs"/>
+              </a:rPr>
               <a:t>филтриране</a:t>
             </a:r>
             <a:r>
-              <a:rPr lang="ru-RU" dirty="0"/>
+              <a:rPr kumimoji="0" lang="ru-RU" sz="2000" b="0" i="0" u="none" strike="noStrike" kern="1200" cap="none" spc="0" normalizeH="0" baseline="0" noProof="0" dirty="0">
+                <a:ln>
+                  <a:noFill/>
+                </a:ln>
+                <a:solidFill>
+                  <a:prstClr val="black">
+                    <a:lumMod val="65000"/>
+                    <a:lumOff val="35000"/>
+                  </a:prstClr>
+                </a:solidFill>
+                <a:effectLst/>
+                <a:uLnTx/>
+                <a:uFillTx/>
+                <a:latin typeface="Corbel" panose="020B0503020204020204" pitchFamily="34" charset="0"/>
+                <a:ea typeface="+mn-ea"/>
+                <a:cs typeface="+mn-cs"/>
+              </a:rPr>
               <a:t>), </a:t>
             </a:r>
             <a:r>
-              <a:rPr lang="ru-RU" dirty="0" err="1"/>
+              <a:rPr kumimoji="0" lang="ru-RU" sz="2000" b="0" i="0" u="none" strike="noStrike" kern="1200" cap="none" spc="0" normalizeH="0" baseline="0" noProof="0" dirty="0" err="1">
+                <a:ln>
+                  <a:noFill/>
+                </a:ln>
+                <a:solidFill>
+                  <a:prstClr val="black">
+                    <a:lumMod val="65000"/>
+                    <a:lumOff val="35000"/>
+                  </a:prstClr>
+                </a:solidFill>
+                <a:effectLst/>
+                <a:uLnTx/>
+                <a:uFillTx/>
+                <a:latin typeface="Corbel" panose="020B0503020204020204" pitchFamily="34" charset="0"/>
+                <a:ea typeface="+mn-ea"/>
+                <a:cs typeface="+mn-cs"/>
+              </a:rPr>
               <a:t>като</a:t>
             </a:r>
             <a:r>
-              <a:rPr lang="ru-RU" dirty="0"/>
+              <a:rPr kumimoji="0" lang="ru-RU" sz="2000" b="0" i="0" u="none" strike="noStrike" kern="1200" cap="none" spc="0" normalizeH="0" baseline="0" noProof="0" dirty="0">
+                <a:ln>
+                  <a:noFill/>
+                </a:ln>
+                <a:solidFill>
+                  <a:prstClr val="black">
+                    <a:lumMod val="65000"/>
+                    <a:lumOff val="35000"/>
+                  </a:prstClr>
+                </a:solidFill>
+                <a:effectLst/>
+                <a:uLnTx/>
+                <a:uFillTx/>
+                <a:latin typeface="Corbel" panose="020B0503020204020204" pitchFamily="34" charset="0"/>
+                <a:ea typeface="+mn-ea"/>
+                <a:cs typeface="+mn-cs"/>
+              </a:rPr>
               <a:t> </a:t>
             </a:r>
             <a:r>
-              <a:rPr lang="ru-RU" dirty="0" err="1"/>
+              <a:rPr kumimoji="0" lang="ru-RU" sz="2000" b="0" i="0" u="none" strike="noStrike" kern="1200" cap="none" spc="0" normalizeH="0" baseline="0" noProof="0" dirty="0" err="1">
+                <a:ln>
+                  <a:noFill/>
+                </a:ln>
+                <a:solidFill>
+                  <a:prstClr val="black">
+                    <a:lumMod val="65000"/>
+                    <a:lumOff val="35000"/>
+                  </a:prstClr>
+                </a:solidFill>
+                <a:effectLst/>
+                <a:uLnTx/>
+                <a:uFillTx/>
+                <a:latin typeface="Corbel" panose="020B0503020204020204" pitchFamily="34" charset="0"/>
+                <a:ea typeface="+mn-ea"/>
+                <a:cs typeface="+mn-cs"/>
+              </a:rPr>
               <a:t>изпълнител</a:t>
             </a:r>
             <a:r>
-              <a:rPr lang="ru-RU" dirty="0"/>
+              <a:rPr kumimoji="0" lang="ru-RU" sz="2000" b="0" i="0" u="none" strike="noStrike" kern="1200" cap="none" spc="0" normalizeH="0" baseline="0" noProof="0" dirty="0">
+                <a:ln>
+                  <a:noFill/>
+                </a:ln>
+                <a:solidFill>
+                  <a:prstClr val="black">
+                    <a:lumMod val="65000"/>
+                    <a:lumOff val="35000"/>
+                  </a:prstClr>
+                </a:solidFill>
+                <a:effectLst/>
+                <a:uLnTx/>
+                <a:uFillTx/>
+                <a:latin typeface="Corbel" panose="020B0503020204020204" pitchFamily="34" charset="0"/>
+                <a:ea typeface="+mn-ea"/>
+                <a:cs typeface="+mn-cs"/>
+              </a:rPr>
               <a:t> (певец/</a:t>
             </a:r>
             <a:r>
-              <a:rPr lang="ru-RU" dirty="0" err="1"/>
+              <a:rPr kumimoji="0" lang="ru-RU" sz="2000" b="0" i="0" u="none" strike="noStrike" kern="1200" cap="none" spc="0" normalizeH="0" baseline="0" noProof="0" dirty="0" err="1">
+                <a:ln>
+                  <a:noFill/>
+                </a:ln>
+                <a:solidFill>
+                  <a:prstClr val="black">
+                    <a:lumMod val="65000"/>
+                    <a:lumOff val="35000"/>
+                  </a:prstClr>
+                </a:solidFill>
+                <a:effectLst/>
+                <a:uLnTx/>
+                <a:uFillTx/>
+                <a:latin typeface="Corbel" panose="020B0503020204020204" pitchFamily="34" charset="0"/>
+                <a:ea typeface="+mn-ea"/>
+                <a:cs typeface="+mn-cs"/>
+              </a:rPr>
               <a:t>група</a:t>
             </a:r>
             <a:r>
-              <a:rPr lang="ru-RU" dirty="0"/>
+              <a:rPr kumimoji="0" lang="ru-RU" sz="2000" b="0" i="0" u="none" strike="noStrike" kern="1200" cap="none" spc="0" normalizeH="0" baseline="0" noProof="0" dirty="0">
+                <a:ln>
+                  <a:noFill/>
+                </a:ln>
+                <a:solidFill>
+                  <a:prstClr val="black">
+                    <a:lumMod val="65000"/>
+                    <a:lumOff val="35000"/>
+                  </a:prstClr>
+                </a:solidFill>
+                <a:effectLst/>
+                <a:uLnTx/>
+                <a:uFillTx/>
+                <a:latin typeface="Corbel" panose="020B0503020204020204" pitchFamily="34" charset="0"/>
+                <a:ea typeface="+mn-ea"/>
+                <a:cs typeface="+mn-cs"/>
+              </a:rPr>
               <a:t>), жанр, </a:t>
             </a:r>
             <a:r>
-              <a:rPr lang="ru-RU" dirty="0" err="1"/>
+              <a:rPr kumimoji="0" lang="ru-RU" sz="2000" b="0" i="0" u="none" strike="noStrike" kern="1200" cap="none" spc="0" normalizeH="0" baseline="0" noProof="0" dirty="0" err="1">
+                <a:ln>
+                  <a:noFill/>
+                </a:ln>
+                <a:solidFill>
+                  <a:prstClr val="black">
+                    <a:lumMod val="65000"/>
+                    <a:lumOff val="35000"/>
+                  </a:prstClr>
+                </a:solidFill>
+                <a:effectLst/>
+                <a:uLnTx/>
+                <a:uFillTx/>
+                <a:latin typeface="Corbel" panose="020B0503020204020204" pitchFamily="34" charset="0"/>
+                <a:ea typeface="+mn-ea"/>
+                <a:cs typeface="+mn-cs"/>
+              </a:rPr>
               <a:t>времетраене</a:t>
             </a:r>
             <a:r>
-              <a:rPr lang="ru-RU" dirty="0"/>
+              <a:rPr kumimoji="0" lang="ru-RU" sz="2000" b="0" i="0" u="none" strike="noStrike" kern="1200" cap="none" spc="0" normalizeH="0" baseline="0" noProof="0" dirty="0">
+                <a:ln>
+                  <a:noFill/>
+                </a:ln>
+                <a:solidFill>
+                  <a:prstClr val="black">
+                    <a:lumMod val="65000"/>
+                    <a:lumOff val="35000"/>
+                  </a:prstClr>
+                </a:solidFill>
+                <a:effectLst/>
+                <a:uLnTx/>
+                <a:uFillTx/>
+                <a:latin typeface="Corbel" panose="020B0503020204020204" pitchFamily="34" charset="0"/>
+                <a:ea typeface="+mn-ea"/>
+                <a:cs typeface="+mn-cs"/>
+              </a:rPr>
               <a:t>, година на </a:t>
             </a:r>
             <a:r>
-              <a:rPr lang="ru-RU" dirty="0" err="1"/>
+              <a:rPr kumimoji="0" lang="ru-RU" sz="2000" b="0" i="0" u="none" strike="noStrike" kern="1200" cap="none" spc="0" normalizeH="0" baseline="0" noProof="0" dirty="0" err="1">
+                <a:ln>
+                  <a:noFill/>
+                </a:ln>
+                <a:solidFill>
+                  <a:prstClr val="black">
+                    <a:lumMod val="65000"/>
+                    <a:lumOff val="35000"/>
+                  </a:prstClr>
+                </a:solidFill>
+                <a:effectLst/>
+                <a:uLnTx/>
+                <a:uFillTx/>
+                <a:latin typeface="Corbel" panose="020B0503020204020204" pitchFamily="34" charset="0"/>
+                <a:ea typeface="+mn-ea"/>
+                <a:cs typeface="+mn-cs"/>
+              </a:rPr>
               <a:t>издаване</a:t>
             </a:r>
-            <a:endParaRPr lang="bg-BG" dirty="0"/>
+            <a:endParaRPr kumimoji="0" lang="bg-BG" sz="2000" b="0" i="0" u="none" strike="noStrike" kern="1200" cap="none" spc="0" normalizeH="0" baseline="0" noProof="0" dirty="0">
+              <a:ln>
+                <a:noFill/>
+              </a:ln>
+              <a:solidFill>
+                <a:prstClr val="black">
+                  <a:lumMod val="65000"/>
+                  <a:lumOff val="35000"/>
+                </a:prstClr>
+              </a:solidFill>
+              <a:effectLst/>
+              <a:uLnTx/>
+              <a:uFillTx/>
+              <a:latin typeface="Corbel" panose="020B0503020204020204" pitchFamily="34" charset="0"/>
+              <a:ea typeface="+mn-ea"/>
+              <a:cs typeface="+mn-cs"/>
+            </a:endParaRPr>
           </a:p>
         </p:txBody>
       </p:sp>
@@ -16950,6 +18399,9 @@
   <p:clrMapOvr>
     <a:masterClrMapping/>
   </p:clrMapOvr>
+  <p:transition spd="slow">
+    <p:push dir="u"/>
+  </p:transition>
 </p:sld>
 </file>
 
@@ -16997,21 +18449,55 @@
                   <a:srgbClr val="ED213D"/>
                 </a:solidFill>
               </a:rPr>
-              <a:t>отчети</a:t>
+              <a:t>Начален екран</a:t>
             </a:r>
           </a:p>
         </p:txBody>
       </p:sp>
+      <p:pic>
+        <p:nvPicPr>
+          <p:cNvPr id="4" name="Picture 8">
+            <a:extLst>
+              <a:ext uri="{FF2B5EF4-FFF2-40B4-BE49-F238E27FC236}">
+                <a16:creationId xmlns:a16="http://schemas.microsoft.com/office/drawing/2014/main" id="{8F3A0DC4-949F-F22E-A746-3FB26FBFD139}"/>
+              </a:ext>
+            </a:extLst>
+          </p:cNvPr>
+          <p:cNvPicPr>
+            <a:picLocks noGrp="1" noChangeAspect="1"/>
+          </p:cNvPicPr>
+          <p:nvPr>
+            <p:ph idx="1"/>
+          </p:nvPr>
+        </p:nvPicPr>
+        <p:blipFill rotWithShape="1">
+          <a:blip r:embed="rId2"/>
+          <a:srcRect r="910"/>
+          <a:stretch/>
+        </p:blipFill>
+        <p:spPr>
+          <a:xfrm>
+            <a:off x="2288461" y="1592001"/>
+            <a:ext cx="7545821" cy="4969417"/>
+          </a:xfrm>
+          <a:prstGeom prst="rect">
+            <a:avLst/>
+          </a:prstGeom>
+        </p:spPr>
+      </p:pic>
     </p:spTree>
     <p:extLst>
       <p:ext uri="{BB962C8B-B14F-4D97-AF65-F5344CB8AC3E}">
-        <p14:creationId xmlns:p14="http://schemas.microsoft.com/office/powerpoint/2010/main" val="2374824080"/>
+        <p14:creationId xmlns:p14="http://schemas.microsoft.com/office/powerpoint/2010/main" val="241362625"/>
       </p:ext>
     </p:extLst>
   </p:cSld>
   <p:clrMapOvr>
     <a:masterClrMapping/>
   </p:clrMapOvr>
+  <p:transition spd="slow">
+    <p:cover/>
+  </p:transition>
 </p:sld>
 </file>
 
@@ -17037,7 +18523,7 @@
           <p:cNvPr id="2" name="Заглавие 1">
             <a:extLst>
               <a:ext uri="{FF2B5EF4-FFF2-40B4-BE49-F238E27FC236}">
-                <a16:creationId xmlns:a16="http://schemas.microsoft.com/office/drawing/2014/main" id="{179F32FD-0866-DF4A-F4C6-B74ADD7DD5F0}"/>
+                <a16:creationId xmlns:a16="http://schemas.microsoft.com/office/drawing/2014/main" id="{926409F7-C4EF-589D-CA14-D649B76BF819}"/>
               </a:ext>
             </a:extLst>
           </p:cNvPr>
@@ -17059,17 +18545,110 @@
                   <a:srgbClr val="ED213D"/>
                 </a:solidFill>
               </a:rPr>
-              <a:t>екрани</a:t>
+              <a:t>Екрани за регистрация и вход</a:t>
             </a:r>
           </a:p>
         </p:txBody>
       </p:sp>
+      <p:pic>
+        <p:nvPicPr>
+          <p:cNvPr id="4" name="Picture 13">
+            <a:extLst>
+              <a:ext uri="{FF2B5EF4-FFF2-40B4-BE49-F238E27FC236}">
+                <a16:creationId xmlns:a16="http://schemas.microsoft.com/office/drawing/2014/main" id="{8CC435C0-1679-8F9F-CFB1-275FCCCEBD57}"/>
+              </a:ext>
+            </a:extLst>
+          </p:cNvPr>
+          <p:cNvPicPr>
+            <a:picLocks noGrp="1" noChangeAspect="1"/>
+          </p:cNvPicPr>
+          <p:nvPr>
+            <p:ph idx="1"/>
+          </p:nvPr>
+        </p:nvPicPr>
+        <p:blipFill rotWithShape="1">
+          <a:blip r:embed="rId2"/>
+          <a:srcRect l="2677" t="2130" r="1"/>
+          <a:stretch/>
+        </p:blipFill>
+        <p:spPr>
+          <a:xfrm>
+            <a:off x="7019364" y="1986466"/>
+            <a:ext cx="4016460" cy="2885067"/>
+          </a:xfrm>
+          <a:prstGeom prst="rect">
+            <a:avLst/>
+          </a:prstGeom>
+        </p:spPr>
+      </p:pic>
+      <p:pic>
+        <p:nvPicPr>
+          <p:cNvPr id="5" name="Picture 14">
+            <a:extLst>
+              <a:ext uri="{FF2B5EF4-FFF2-40B4-BE49-F238E27FC236}">
+                <a16:creationId xmlns:a16="http://schemas.microsoft.com/office/drawing/2014/main" id="{E2EC0404-59C2-90FE-EE96-E3CBE010B530}"/>
+              </a:ext>
+            </a:extLst>
+          </p:cNvPr>
+          <p:cNvPicPr>
+            <a:picLocks noChangeAspect="1"/>
+          </p:cNvPicPr>
+          <p:nvPr/>
+        </p:nvPicPr>
+        <p:blipFill rotWithShape="1">
+          <a:blip r:embed="rId3"/>
+          <a:srcRect l="1364"/>
+          <a:stretch/>
+        </p:blipFill>
+        <p:spPr>
+          <a:xfrm>
+            <a:off x="1647232" y="1986466"/>
+            <a:ext cx="4448768" cy="2885067"/>
+          </a:xfrm>
+          <a:prstGeom prst="rect">
+            <a:avLst/>
+          </a:prstGeom>
+        </p:spPr>
+      </p:pic>
+    </p:spTree>
+    <p:extLst>
+      <p:ext uri="{BB962C8B-B14F-4D97-AF65-F5344CB8AC3E}">
+        <p14:creationId xmlns:p14="http://schemas.microsoft.com/office/powerpoint/2010/main" val="2749026149"/>
+      </p:ext>
+    </p:extLst>
+  </p:cSld>
+  <p:clrMapOvr>
+    <a:masterClrMapping/>
+  </p:clrMapOvr>
+  <p:transition spd="slow">
+    <p:push dir="u"/>
+  </p:transition>
+</p:sld>
+</file>
+
+<file path=ppt/slides/slide22.xml><?xml version="1.0" encoding="utf-8"?>
+<p:sld xmlns:a="http://schemas.openxmlformats.org/drawingml/2006/main" xmlns:r="http://schemas.openxmlformats.org/officeDocument/2006/relationships" xmlns:p="http://schemas.openxmlformats.org/presentationml/2006/main">
+  <p:cSld>
+    <p:spTree>
+      <p:nvGrpSpPr>
+        <p:cNvPr id="1" name=""/>
+        <p:cNvGrpSpPr/>
+        <p:nvPr/>
+      </p:nvGrpSpPr>
+      <p:grpSpPr>
+        <a:xfrm>
+          <a:off x="0" y="0"/>
+          <a:ext cx="0" cy="0"/>
+          <a:chOff x="0" y="0"/>
+          <a:chExt cx="0" cy="0"/>
+        </a:xfrm>
+      </p:grpSpPr>
       <p:sp>
         <p:nvSpPr>
-          <p:cNvPr id="3" name="Контейнер за съдържание 2">
+          <p:cNvPr id="2" name="Заглавие 1">
             <a:extLst>
               <a:ext uri="{FF2B5EF4-FFF2-40B4-BE49-F238E27FC236}">
-                <a16:creationId xmlns:a16="http://schemas.microsoft.com/office/drawing/2014/main" id="{2A8BFA13-0DDB-F3BB-6139-AA7DFA822DA1}"/>
+                <a16:creationId xmlns:a16="http://schemas.microsoft.com/office/drawing/2014/main" id="{926409F7-C4EF-589D-CA14-D649B76BF819}"/>
               </a:ext>
             </a:extLst>
           </p:cNvPr>
@@ -17077,7 +18656,7 @@
             <a:spLocks noGrp="1"/>
           </p:cNvSpPr>
           <p:nvPr>
-            <p:ph idx="1"/>
+            <p:ph type="title"/>
           </p:nvPr>
         </p:nvSpPr>
         <p:spPr/>
@@ -17085,24 +18664,188 @@
           <a:bodyPr/>
           <a:lstStyle/>
           <a:p>
-            <a:endParaRPr lang="bg-BG" dirty="0"/>
+            <a:r>
+              <a:rPr lang="bg-BG" dirty="0">
+                <a:solidFill>
+                  <a:srgbClr val="ED213D"/>
+                </a:solidFill>
+              </a:rPr>
+              <a:t>Екран след вход в системата</a:t>
+            </a:r>
           </a:p>
         </p:txBody>
       </p:sp>
+      <p:pic>
+        <p:nvPicPr>
+          <p:cNvPr id="4" name="Picture 15">
+            <a:extLst>
+              <a:ext uri="{FF2B5EF4-FFF2-40B4-BE49-F238E27FC236}">
+                <a16:creationId xmlns:a16="http://schemas.microsoft.com/office/drawing/2014/main" id="{A2A91936-38FD-76C1-D5D9-0DE91EE615F3}"/>
+              </a:ext>
+            </a:extLst>
+          </p:cNvPr>
+          <p:cNvPicPr>
+            <a:picLocks noChangeAspect="1"/>
+          </p:cNvPicPr>
+          <p:nvPr/>
+        </p:nvPicPr>
+        <p:blipFill>
+          <a:blip r:embed="rId2"/>
+          <a:stretch>
+            <a:fillRect/>
+          </a:stretch>
+        </p:blipFill>
+        <p:spPr>
+          <a:xfrm>
+            <a:off x="2548516" y="1658245"/>
+            <a:ext cx="7094967" cy="4688765"/>
+          </a:xfrm>
+          <a:prstGeom prst="rect">
+            <a:avLst/>
+          </a:prstGeom>
+        </p:spPr>
+      </p:pic>
     </p:spTree>
     <p:extLst>
       <p:ext uri="{BB962C8B-B14F-4D97-AF65-F5344CB8AC3E}">
-        <p14:creationId xmlns:p14="http://schemas.microsoft.com/office/powerpoint/2010/main" val="241362625"/>
+        <p14:creationId xmlns:p14="http://schemas.microsoft.com/office/powerpoint/2010/main" val="4044301165"/>
       </p:ext>
     </p:extLst>
   </p:cSld>
   <p:clrMapOvr>
     <a:masterClrMapping/>
   </p:clrMapOvr>
+  <p:transition spd="slow">
+    <p:push dir="u"/>
+  </p:transition>
 </p:sld>
 </file>
 
-<file path=ppt/slides/slide22.xml><?xml version="1.0" encoding="utf-8"?>
+<file path=ppt/slides/slide23.xml><?xml version="1.0" encoding="utf-8"?>
+<p:sld xmlns:a="http://schemas.openxmlformats.org/drawingml/2006/main" xmlns:r="http://schemas.openxmlformats.org/officeDocument/2006/relationships" xmlns:p="http://schemas.openxmlformats.org/presentationml/2006/main">
+  <p:cSld>
+    <p:spTree>
+      <p:nvGrpSpPr>
+        <p:cNvPr id="1" name=""/>
+        <p:cNvGrpSpPr/>
+        <p:nvPr/>
+      </p:nvGrpSpPr>
+      <p:grpSpPr>
+        <a:xfrm>
+          <a:off x="0" y="0"/>
+          <a:ext cx="0" cy="0"/>
+          <a:chOff x="0" y="0"/>
+          <a:chExt cx="0" cy="0"/>
+        </a:xfrm>
+      </p:grpSpPr>
+      <p:sp>
+        <p:nvSpPr>
+          <p:cNvPr id="2" name="Заглавие 1">
+            <a:extLst>
+              <a:ext uri="{FF2B5EF4-FFF2-40B4-BE49-F238E27FC236}">
+                <a16:creationId xmlns:a16="http://schemas.microsoft.com/office/drawing/2014/main" id="{926409F7-C4EF-589D-CA14-D649B76BF819}"/>
+              </a:ext>
+            </a:extLst>
+          </p:cNvPr>
+          <p:cNvSpPr>
+            <a:spLocks noGrp="1"/>
+          </p:cNvSpPr>
+          <p:nvPr>
+            <p:ph type="title"/>
+          </p:nvPr>
+        </p:nvSpPr>
+        <p:spPr/>
+        <p:txBody>
+          <a:bodyPr/>
+          <a:lstStyle/>
+          <a:p>
+            <a:r>
+              <a:rPr lang="bg-BG" dirty="0">
+                <a:solidFill>
+                  <a:srgbClr val="ED213D"/>
+                </a:solidFill>
+              </a:rPr>
+              <a:t>Екрани за добавяне и търсене на песен</a:t>
+            </a:r>
+          </a:p>
+        </p:txBody>
+      </p:sp>
+      <p:pic>
+        <p:nvPicPr>
+          <p:cNvPr id="4" name="Picture 16">
+            <a:extLst>
+              <a:ext uri="{FF2B5EF4-FFF2-40B4-BE49-F238E27FC236}">
+                <a16:creationId xmlns:a16="http://schemas.microsoft.com/office/drawing/2014/main" id="{F0BC019A-D4F2-04C1-DE68-2F3F14F0581A}"/>
+              </a:ext>
+            </a:extLst>
+          </p:cNvPr>
+          <p:cNvPicPr>
+            <a:picLocks noChangeAspect="1"/>
+          </p:cNvPicPr>
+          <p:nvPr/>
+        </p:nvPicPr>
+        <p:blipFill rotWithShape="1">
+          <a:blip r:embed="rId2"/>
+          <a:srcRect l="497" t="1550" r="1201"/>
+          <a:stretch/>
+        </p:blipFill>
+        <p:spPr>
+          <a:xfrm>
+            <a:off x="1978351" y="2122573"/>
+            <a:ext cx="3239109" cy="3558985"/>
+          </a:xfrm>
+          <a:prstGeom prst="rect">
+            <a:avLst/>
+          </a:prstGeom>
+        </p:spPr>
+      </p:pic>
+      <p:pic>
+        <p:nvPicPr>
+          <p:cNvPr id="5" name="Picture 17">
+            <a:extLst>
+              <a:ext uri="{FF2B5EF4-FFF2-40B4-BE49-F238E27FC236}">
+                <a16:creationId xmlns:a16="http://schemas.microsoft.com/office/drawing/2014/main" id="{16403B80-0F7D-454E-81F9-0D6A26331E60}"/>
+              </a:ext>
+            </a:extLst>
+          </p:cNvPr>
+          <p:cNvPicPr>
+            <a:picLocks noChangeAspect="1"/>
+          </p:cNvPicPr>
+          <p:nvPr/>
+        </p:nvPicPr>
+        <p:blipFill>
+          <a:blip r:embed="rId3"/>
+          <a:stretch>
+            <a:fillRect/>
+          </a:stretch>
+        </p:blipFill>
+        <p:spPr>
+          <a:xfrm>
+            <a:off x="6974542" y="1989603"/>
+            <a:ext cx="3028501" cy="3824923"/>
+          </a:xfrm>
+          <a:prstGeom prst="rect">
+            <a:avLst/>
+          </a:prstGeom>
+        </p:spPr>
+      </p:pic>
+    </p:spTree>
+    <p:extLst>
+      <p:ext uri="{BB962C8B-B14F-4D97-AF65-F5344CB8AC3E}">
+        <p14:creationId xmlns:p14="http://schemas.microsoft.com/office/powerpoint/2010/main" val="1778915958"/>
+      </p:ext>
+    </p:extLst>
+  </p:cSld>
+  <p:clrMapOvr>
+    <a:masterClrMapping/>
+  </p:clrMapOvr>
+  <p:transition spd="slow">
+    <p:push dir="u"/>
+  </p:transition>
+</p:sld>
+</file>
+
+<file path=ppt/slides/slide24.xml><?xml version="1.0" encoding="utf-8"?>
 <p:sld xmlns:a="http://schemas.openxmlformats.org/drawingml/2006/main" xmlns:r="http://schemas.openxmlformats.org/officeDocument/2006/relationships" xmlns:p="http://schemas.openxmlformats.org/presentationml/2006/main">
   <p:cSld>
     <p:spTree>
@@ -17302,6 +19045,18 @@
   <p:clrMapOvr>
     <a:masterClrMapping/>
   </p:clrMapOvr>
+  <mc:AlternateContent xmlns:mc="http://schemas.openxmlformats.org/markup-compatibility/2006">
+    <mc:Choice xmlns:p14="http://schemas.microsoft.com/office/powerpoint/2010/main" Requires="p14">
+      <p:transition spd="slow">
+        <p14:pan dir="u"/>
+      </p:transition>
+    </mc:Choice>
+    <mc:Fallback>
+      <p:transition spd="slow">
+        <p:fade/>
+      </p:transition>
+    </mc:Fallback>
+  </mc:AlternateContent>
 </p:sld>
 </file>
 
@@ -17761,6 +19516,9 @@
   <p:clrMapOvr>
     <a:masterClrMapping/>
   </p:clrMapOvr>
+  <p:transition spd="med">
+    <p:pull/>
+  </p:transition>
 </p:sld>
 </file>
 
@@ -18333,6 +20091,18 @@
   <p:clrMapOvr>
     <a:masterClrMapping/>
   </p:clrMapOvr>
+  <mc:AlternateContent xmlns:mc="http://schemas.openxmlformats.org/markup-compatibility/2006">
+    <mc:Choice xmlns:p14="http://schemas.microsoft.com/office/powerpoint/2010/main" Requires="p14">
+      <p:transition spd="med" p14:dur="700">
+        <p:fade/>
+      </p:transition>
+    </mc:Choice>
+    <mc:Fallback>
+      <p:transition spd="med">
+        <p:fade/>
+      </p:transition>
+    </mc:Fallback>
+  </mc:AlternateContent>
 </p:sld>
 </file>
 
@@ -18426,6 +20196,422 @@
   <p:clrMapOvr>
     <a:masterClrMapping/>
   </p:clrMapOvr>
+  <p:transition spd="med">
+    <p:pull/>
+  </p:transition>
+  <p:timing>
+    <p:tnLst>
+      <p:par>
+        <p:cTn id="1" dur="indefinite" restart="never" nodeType="tmRoot">
+          <p:childTnLst>
+            <p:seq concurrent="1" nextAc="seek">
+              <p:cTn id="2" dur="indefinite" nodeType="mainSeq">
+                <p:childTnLst>
+                  <p:par>
+                    <p:cTn id="3" fill="hold">
+                      <p:stCondLst>
+                        <p:cond delay="indefinite"/>
+                        <p:cond evt="onBegin" delay="0">
+                          <p:tn val="2"/>
+                        </p:cond>
+                      </p:stCondLst>
+                      <p:childTnLst>
+                        <p:par>
+                          <p:cTn id="4" fill="hold">
+                            <p:stCondLst>
+                              <p:cond delay="0"/>
+                            </p:stCondLst>
+                            <p:childTnLst>
+                              <p:par>
+                                <p:cTn id="5" presetID="22" presetClass="entr" presetSubtype="4" fill="hold" grpId="0" nodeType="afterEffect">
+                                  <p:stCondLst>
+                                    <p:cond delay="0"/>
+                                  </p:stCondLst>
+                                  <p:childTnLst>
+                                    <p:set>
+                                      <p:cBhvr>
+                                        <p:cTn id="6" dur="1" fill="hold">
+                                          <p:stCondLst>
+                                            <p:cond delay="0"/>
+                                          </p:stCondLst>
+                                        </p:cTn>
+                                        <p:tgtEl>
+                                          <p:spTgt spid="8">
+                                            <p:graphicEl>
+                                              <a:chart seriesIdx="-3" categoryIdx="-3" bldStep="gridLegend"/>
+                                            </p:graphicEl>
+                                          </p:spTgt>
+                                        </p:tgtEl>
+                                        <p:attrNameLst>
+                                          <p:attrName>style.visibility</p:attrName>
+                                        </p:attrNameLst>
+                                      </p:cBhvr>
+                                      <p:to>
+                                        <p:strVal val="visible"/>
+                                      </p:to>
+                                    </p:set>
+                                    <p:animEffect transition="in" filter="wipe(down)">
+                                      <p:cBhvr>
+                                        <p:cTn id="7" dur="500"/>
+                                        <p:tgtEl>
+                                          <p:spTgt spid="8">
+                                            <p:graphicEl>
+                                              <a:chart seriesIdx="-3" categoryIdx="-3" bldStep="gridLegend"/>
+                                            </p:graphicEl>
+                                          </p:spTgt>
+                                        </p:tgtEl>
+                                      </p:cBhvr>
+                                    </p:animEffect>
+                                  </p:childTnLst>
+                                </p:cTn>
+                              </p:par>
+                            </p:childTnLst>
+                          </p:cTn>
+                        </p:par>
+                        <p:par>
+                          <p:cTn id="8" fill="hold">
+                            <p:stCondLst>
+                              <p:cond delay="500"/>
+                            </p:stCondLst>
+                            <p:childTnLst>
+                              <p:par>
+                                <p:cTn id="9" presetID="22" presetClass="entr" presetSubtype="4" fill="hold" grpId="0" nodeType="afterEffect">
+                                  <p:stCondLst>
+                                    <p:cond delay="0"/>
+                                  </p:stCondLst>
+                                  <p:childTnLst>
+                                    <p:set>
+                                      <p:cBhvr>
+                                        <p:cTn id="10" dur="1" fill="hold">
+                                          <p:stCondLst>
+                                            <p:cond delay="0"/>
+                                          </p:stCondLst>
+                                        </p:cTn>
+                                        <p:tgtEl>
+                                          <p:spTgt spid="8">
+                                            <p:graphicEl>
+                                              <a:chart seriesIdx="0" categoryIdx="0" bldStep="ptInSeries"/>
+                                            </p:graphicEl>
+                                          </p:spTgt>
+                                        </p:tgtEl>
+                                        <p:attrNameLst>
+                                          <p:attrName>style.visibility</p:attrName>
+                                        </p:attrNameLst>
+                                      </p:cBhvr>
+                                      <p:to>
+                                        <p:strVal val="visible"/>
+                                      </p:to>
+                                    </p:set>
+                                    <p:animEffect transition="in" filter="wipe(down)">
+                                      <p:cBhvr>
+                                        <p:cTn id="11" dur="500"/>
+                                        <p:tgtEl>
+                                          <p:spTgt spid="8">
+                                            <p:graphicEl>
+                                              <a:chart seriesIdx="0" categoryIdx="0" bldStep="ptInSeries"/>
+                                            </p:graphicEl>
+                                          </p:spTgt>
+                                        </p:tgtEl>
+                                      </p:cBhvr>
+                                    </p:animEffect>
+                                  </p:childTnLst>
+                                </p:cTn>
+                              </p:par>
+                            </p:childTnLst>
+                          </p:cTn>
+                        </p:par>
+                        <p:par>
+                          <p:cTn id="12" fill="hold">
+                            <p:stCondLst>
+                              <p:cond delay="1000"/>
+                            </p:stCondLst>
+                            <p:childTnLst>
+                              <p:par>
+                                <p:cTn id="13" presetID="22" presetClass="entr" presetSubtype="4" fill="hold" grpId="0" nodeType="afterEffect">
+                                  <p:stCondLst>
+                                    <p:cond delay="0"/>
+                                  </p:stCondLst>
+                                  <p:childTnLst>
+                                    <p:set>
+                                      <p:cBhvr>
+                                        <p:cTn id="14" dur="1" fill="hold">
+                                          <p:stCondLst>
+                                            <p:cond delay="0"/>
+                                          </p:stCondLst>
+                                        </p:cTn>
+                                        <p:tgtEl>
+                                          <p:spTgt spid="8">
+                                            <p:graphicEl>
+                                              <a:chart seriesIdx="0" categoryIdx="1" bldStep="ptInSeries"/>
+                                            </p:graphicEl>
+                                          </p:spTgt>
+                                        </p:tgtEl>
+                                        <p:attrNameLst>
+                                          <p:attrName>style.visibility</p:attrName>
+                                        </p:attrNameLst>
+                                      </p:cBhvr>
+                                      <p:to>
+                                        <p:strVal val="visible"/>
+                                      </p:to>
+                                    </p:set>
+                                    <p:animEffect transition="in" filter="wipe(down)">
+                                      <p:cBhvr>
+                                        <p:cTn id="15" dur="500"/>
+                                        <p:tgtEl>
+                                          <p:spTgt spid="8">
+                                            <p:graphicEl>
+                                              <a:chart seriesIdx="0" categoryIdx="1" bldStep="ptInSeries"/>
+                                            </p:graphicEl>
+                                          </p:spTgt>
+                                        </p:tgtEl>
+                                      </p:cBhvr>
+                                    </p:animEffect>
+                                  </p:childTnLst>
+                                </p:cTn>
+                              </p:par>
+                            </p:childTnLst>
+                          </p:cTn>
+                        </p:par>
+                        <p:par>
+                          <p:cTn id="16" fill="hold">
+                            <p:stCondLst>
+                              <p:cond delay="1500"/>
+                            </p:stCondLst>
+                            <p:childTnLst>
+                              <p:par>
+                                <p:cTn id="17" presetID="22" presetClass="entr" presetSubtype="4" fill="hold" grpId="0" nodeType="afterEffect">
+                                  <p:stCondLst>
+                                    <p:cond delay="0"/>
+                                  </p:stCondLst>
+                                  <p:childTnLst>
+                                    <p:set>
+                                      <p:cBhvr>
+                                        <p:cTn id="18" dur="1" fill="hold">
+                                          <p:stCondLst>
+                                            <p:cond delay="0"/>
+                                          </p:stCondLst>
+                                        </p:cTn>
+                                        <p:tgtEl>
+                                          <p:spTgt spid="8">
+                                            <p:graphicEl>
+                                              <a:chart seriesIdx="0" categoryIdx="2" bldStep="ptInSeries"/>
+                                            </p:graphicEl>
+                                          </p:spTgt>
+                                        </p:tgtEl>
+                                        <p:attrNameLst>
+                                          <p:attrName>style.visibility</p:attrName>
+                                        </p:attrNameLst>
+                                      </p:cBhvr>
+                                      <p:to>
+                                        <p:strVal val="visible"/>
+                                      </p:to>
+                                    </p:set>
+                                    <p:animEffect transition="in" filter="wipe(down)">
+                                      <p:cBhvr>
+                                        <p:cTn id="19" dur="500"/>
+                                        <p:tgtEl>
+                                          <p:spTgt spid="8">
+                                            <p:graphicEl>
+                                              <a:chart seriesIdx="0" categoryIdx="2" bldStep="ptInSeries"/>
+                                            </p:graphicEl>
+                                          </p:spTgt>
+                                        </p:tgtEl>
+                                      </p:cBhvr>
+                                    </p:animEffect>
+                                  </p:childTnLst>
+                                </p:cTn>
+                              </p:par>
+                            </p:childTnLst>
+                          </p:cTn>
+                        </p:par>
+                        <p:par>
+                          <p:cTn id="20" fill="hold">
+                            <p:stCondLst>
+                              <p:cond delay="2000"/>
+                            </p:stCondLst>
+                            <p:childTnLst>
+                              <p:par>
+                                <p:cTn id="21" presetID="22" presetClass="entr" presetSubtype="4" fill="hold" grpId="0" nodeType="afterEffect">
+                                  <p:stCondLst>
+                                    <p:cond delay="0"/>
+                                  </p:stCondLst>
+                                  <p:childTnLst>
+                                    <p:set>
+                                      <p:cBhvr>
+                                        <p:cTn id="22" dur="1" fill="hold">
+                                          <p:stCondLst>
+                                            <p:cond delay="0"/>
+                                          </p:stCondLst>
+                                        </p:cTn>
+                                        <p:tgtEl>
+                                          <p:spTgt spid="8">
+                                            <p:graphicEl>
+                                              <a:chart seriesIdx="0" categoryIdx="3" bldStep="ptInSeries"/>
+                                            </p:graphicEl>
+                                          </p:spTgt>
+                                        </p:tgtEl>
+                                        <p:attrNameLst>
+                                          <p:attrName>style.visibility</p:attrName>
+                                        </p:attrNameLst>
+                                      </p:cBhvr>
+                                      <p:to>
+                                        <p:strVal val="visible"/>
+                                      </p:to>
+                                    </p:set>
+                                    <p:animEffect transition="in" filter="wipe(down)">
+                                      <p:cBhvr>
+                                        <p:cTn id="23" dur="500"/>
+                                        <p:tgtEl>
+                                          <p:spTgt spid="8">
+                                            <p:graphicEl>
+                                              <a:chart seriesIdx="0" categoryIdx="3" bldStep="ptInSeries"/>
+                                            </p:graphicEl>
+                                          </p:spTgt>
+                                        </p:tgtEl>
+                                      </p:cBhvr>
+                                    </p:animEffect>
+                                  </p:childTnLst>
+                                </p:cTn>
+                              </p:par>
+                            </p:childTnLst>
+                          </p:cTn>
+                        </p:par>
+                        <p:par>
+                          <p:cTn id="24" fill="hold">
+                            <p:stCondLst>
+                              <p:cond delay="2500"/>
+                            </p:stCondLst>
+                            <p:childTnLst>
+                              <p:par>
+                                <p:cTn id="25" presetID="22" presetClass="entr" presetSubtype="4" fill="hold" grpId="0" nodeType="afterEffect">
+                                  <p:stCondLst>
+                                    <p:cond delay="0"/>
+                                  </p:stCondLst>
+                                  <p:childTnLst>
+                                    <p:set>
+                                      <p:cBhvr>
+                                        <p:cTn id="26" dur="1" fill="hold">
+                                          <p:stCondLst>
+                                            <p:cond delay="0"/>
+                                          </p:stCondLst>
+                                        </p:cTn>
+                                        <p:tgtEl>
+                                          <p:spTgt spid="8">
+                                            <p:graphicEl>
+                                              <a:chart seriesIdx="0" categoryIdx="4" bldStep="ptInSeries"/>
+                                            </p:graphicEl>
+                                          </p:spTgt>
+                                        </p:tgtEl>
+                                        <p:attrNameLst>
+                                          <p:attrName>style.visibility</p:attrName>
+                                        </p:attrNameLst>
+                                      </p:cBhvr>
+                                      <p:to>
+                                        <p:strVal val="visible"/>
+                                      </p:to>
+                                    </p:set>
+                                    <p:animEffect transition="in" filter="wipe(down)">
+                                      <p:cBhvr>
+                                        <p:cTn id="27" dur="500"/>
+                                        <p:tgtEl>
+                                          <p:spTgt spid="8">
+                                            <p:graphicEl>
+                                              <a:chart seriesIdx="0" categoryIdx="4" bldStep="ptInSeries"/>
+                                            </p:graphicEl>
+                                          </p:spTgt>
+                                        </p:tgtEl>
+                                      </p:cBhvr>
+                                    </p:animEffect>
+                                  </p:childTnLst>
+                                </p:cTn>
+                              </p:par>
+                            </p:childTnLst>
+                          </p:cTn>
+                        </p:par>
+                        <p:par>
+                          <p:cTn id="28" fill="hold">
+                            <p:stCondLst>
+                              <p:cond delay="3000"/>
+                            </p:stCondLst>
+                            <p:childTnLst>
+                              <p:par>
+                                <p:cTn id="29" presetID="22" presetClass="entr" presetSubtype="4" fill="hold" grpId="0" nodeType="afterEffect">
+                                  <p:stCondLst>
+                                    <p:cond delay="0"/>
+                                  </p:stCondLst>
+                                  <p:childTnLst>
+                                    <p:set>
+                                      <p:cBhvr>
+                                        <p:cTn id="30" dur="1" fill="hold">
+                                          <p:stCondLst>
+                                            <p:cond delay="0"/>
+                                          </p:stCondLst>
+                                        </p:cTn>
+                                        <p:tgtEl>
+                                          <p:spTgt spid="8">
+                                            <p:graphicEl>
+                                              <a:chart seriesIdx="0" categoryIdx="5" bldStep="ptInSeries"/>
+                                            </p:graphicEl>
+                                          </p:spTgt>
+                                        </p:tgtEl>
+                                        <p:attrNameLst>
+                                          <p:attrName>style.visibility</p:attrName>
+                                        </p:attrNameLst>
+                                      </p:cBhvr>
+                                      <p:to>
+                                        <p:strVal val="visible"/>
+                                      </p:to>
+                                    </p:set>
+                                    <p:animEffect transition="in" filter="wipe(down)">
+                                      <p:cBhvr>
+                                        <p:cTn id="31" dur="500"/>
+                                        <p:tgtEl>
+                                          <p:spTgt spid="8">
+                                            <p:graphicEl>
+                                              <a:chart seriesIdx="0" categoryIdx="5" bldStep="ptInSeries"/>
+                                            </p:graphicEl>
+                                          </p:spTgt>
+                                        </p:tgtEl>
+                                      </p:cBhvr>
+                                    </p:animEffect>
+                                  </p:childTnLst>
+                                </p:cTn>
+                              </p:par>
+                            </p:childTnLst>
+                          </p:cTn>
+                        </p:par>
+                      </p:childTnLst>
+                    </p:cTn>
+                  </p:par>
+                </p:childTnLst>
+              </p:cTn>
+              <p:prevCondLst>
+                <p:cond evt="onPrev" delay="0">
+                  <p:tgtEl>
+                    <p:sldTgt/>
+                  </p:tgtEl>
+                </p:cond>
+              </p:prevCondLst>
+              <p:nextCondLst>
+                <p:cond evt="onNext" delay="0">
+                  <p:tgtEl>
+                    <p:sldTgt/>
+                  </p:tgtEl>
+                </p:cond>
+              </p:nextCondLst>
+            </p:seq>
+          </p:childTnLst>
+        </p:cTn>
+      </p:par>
+    </p:tnLst>
+    <p:bldLst>
+      <p:bldGraphic spid="8" grpId="0" uiExpand="1">
+        <p:bldSub>
+          <a:bldChart bld="seriesEl"/>
+        </p:bldSub>
+      </p:bldGraphic>
+    </p:bldLst>
+  </p:timing>
 </p:sld>
 </file>
 
@@ -18810,6 +20996,153 @@
   <p:clrMapOvr>
     <a:masterClrMapping/>
   </p:clrMapOvr>
+  <mc:AlternateContent xmlns:mc="http://schemas.openxmlformats.org/markup-compatibility/2006">
+    <mc:Choice xmlns:p14="http://schemas.microsoft.com/office/powerpoint/2010/main" Requires="p14">
+      <p:transition spd="slow" p14:dur="1500">
+        <p14:reveal/>
+      </p:transition>
+    </mc:Choice>
+    <mc:Fallback>
+      <p:transition spd="slow">
+        <p:fade/>
+      </p:transition>
+    </mc:Fallback>
+  </mc:AlternateContent>
+  <p:timing>
+    <p:tnLst>
+      <p:par>
+        <p:cTn id="1" dur="indefinite" restart="never" nodeType="tmRoot">
+          <p:childTnLst>
+            <p:seq concurrent="1" nextAc="seek">
+              <p:cTn id="2" dur="indefinite" nodeType="mainSeq">
+                <p:childTnLst>
+                  <p:par>
+                    <p:cTn id="3" fill="hold">
+                      <p:stCondLst>
+                        <p:cond delay="indefinite"/>
+                        <p:cond evt="onBegin" delay="0">
+                          <p:tn val="2"/>
+                        </p:cond>
+                      </p:stCondLst>
+                      <p:childTnLst>
+                        <p:par>
+                          <p:cTn id="4" fill="hold">
+                            <p:stCondLst>
+                              <p:cond delay="0"/>
+                            </p:stCondLst>
+                            <p:childTnLst>
+                              <p:par>
+                                <p:cTn id="5" presetID="32" presetClass="emph" presetSubtype="0" fill="hold" nodeType="afterEffect">
+                                  <p:stCondLst>
+                                    <p:cond delay="0"/>
+                                  </p:stCondLst>
+                                  <p:childTnLst>
+                                    <p:animRot by="120000">
+                                      <p:cBhvr>
+                                        <p:cTn id="6" dur="100" fill="hold">
+                                          <p:stCondLst>
+                                            <p:cond delay="0"/>
+                                          </p:stCondLst>
+                                        </p:cTn>
+                                        <p:tgtEl>
+                                          <p:spTgt spid="4"/>
+                                        </p:tgtEl>
+                                        <p:attrNameLst>
+                                          <p:attrName>r</p:attrName>
+                                        </p:attrNameLst>
+                                      </p:cBhvr>
+                                    </p:animRot>
+                                    <p:animRot by="-240000">
+                                      <p:cBhvr>
+                                        <p:cTn id="7" dur="200" fill="hold">
+                                          <p:stCondLst>
+                                            <p:cond delay="200"/>
+                                          </p:stCondLst>
+                                        </p:cTn>
+                                        <p:tgtEl>
+                                          <p:spTgt spid="4"/>
+                                        </p:tgtEl>
+                                        <p:attrNameLst>
+                                          <p:attrName>r</p:attrName>
+                                        </p:attrNameLst>
+                                      </p:cBhvr>
+                                    </p:animRot>
+                                    <p:animRot by="240000">
+                                      <p:cBhvr>
+                                        <p:cTn id="8" dur="200" fill="hold">
+                                          <p:stCondLst>
+                                            <p:cond delay="400"/>
+                                          </p:stCondLst>
+                                        </p:cTn>
+                                        <p:tgtEl>
+                                          <p:spTgt spid="4"/>
+                                        </p:tgtEl>
+                                        <p:attrNameLst>
+                                          <p:attrName>r</p:attrName>
+                                        </p:attrNameLst>
+                                      </p:cBhvr>
+                                    </p:animRot>
+                                    <p:animRot by="-240000">
+                                      <p:cBhvr>
+                                        <p:cTn id="9" dur="200" fill="hold">
+                                          <p:stCondLst>
+                                            <p:cond delay="600"/>
+                                          </p:stCondLst>
+                                        </p:cTn>
+                                        <p:tgtEl>
+                                          <p:spTgt spid="4"/>
+                                        </p:tgtEl>
+                                        <p:attrNameLst>
+                                          <p:attrName>r</p:attrName>
+                                        </p:attrNameLst>
+                                      </p:cBhvr>
+                                    </p:animRot>
+                                    <p:animRot by="120000">
+                                      <p:cBhvr>
+                                        <p:cTn id="10" dur="200" fill="hold">
+                                          <p:stCondLst>
+                                            <p:cond delay="800"/>
+                                          </p:stCondLst>
+                                        </p:cTn>
+                                        <p:tgtEl>
+                                          <p:spTgt spid="4"/>
+                                        </p:tgtEl>
+                                        <p:attrNameLst>
+                                          <p:attrName>r</p:attrName>
+                                        </p:attrNameLst>
+                                      </p:cBhvr>
+                                    </p:animRot>
+                                  </p:childTnLst>
+                                </p:cTn>
+                              </p:par>
+                            </p:childTnLst>
+                          </p:cTn>
+                        </p:par>
+                      </p:childTnLst>
+                    </p:cTn>
+                  </p:par>
+                </p:childTnLst>
+              </p:cTn>
+              <p:prevCondLst>
+                <p:cond evt="onPrev" delay="0">
+                  <p:tgtEl>
+                    <p:sldTgt/>
+                  </p:tgtEl>
+                </p:cond>
+              </p:prevCondLst>
+              <p:nextCondLst>
+                <p:cond evt="onNext" delay="0">
+                  <p:tgtEl>
+                    <p:sldTgt/>
+                  </p:tgtEl>
+                </p:cond>
+              </p:nextCondLst>
+            </p:seq>
+          </p:childTnLst>
+        </p:cTn>
+      </p:par>
+    </p:tnLst>
+  </p:timing>
 </p:sld>
 </file>
 
@@ -20000,6 +22333,95 @@
   <p:clrMapOvr>
     <a:masterClrMapping/>
   </p:clrMapOvr>
+  <mc:AlternateContent xmlns:mc="http://schemas.openxmlformats.org/markup-compatibility/2006">
+    <mc:Choice xmlns:p159="http://schemas.microsoft.com/office/powerpoint/2015/09/main" Requires="p159">
+      <p:transition xmlns:p14="http://schemas.microsoft.com/office/powerpoint/2010/main" spd="slow" p14:dur="1500">
+        <p159:morph option="byObject"/>
+      </p:transition>
+    </mc:Choice>
+    <mc:Fallback>
+      <p:transition spd="slow">
+        <p:fade/>
+      </p:transition>
+    </mc:Fallback>
+  </mc:AlternateContent>
+  <p:timing>
+    <p:tnLst>
+      <p:par>
+        <p:cTn id="1" dur="indefinite" restart="never" nodeType="tmRoot">
+          <p:childTnLst>
+            <p:seq concurrent="1" nextAc="seek">
+              <p:cTn id="2" dur="indefinite" nodeType="mainSeq">
+                <p:childTnLst>
+                  <p:par>
+                    <p:cTn id="3" fill="hold">
+                      <p:stCondLst>
+                        <p:cond delay="indefinite"/>
+                        <p:cond evt="onBegin" delay="0">
+                          <p:tn val="2"/>
+                        </p:cond>
+                      </p:stCondLst>
+                      <p:childTnLst>
+                        <p:par>
+                          <p:cTn id="4" fill="hold">
+                            <p:stCondLst>
+                              <p:cond delay="0"/>
+                            </p:stCondLst>
+                            <p:childTnLst>
+                              <p:par>
+                                <p:cTn id="5" presetID="26" presetClass="emph" presetSubtype="0" fill="hold" nodeType="afterEffect">
+                                  <p:stCondLst>
+                                    <p:cond delay="0"/>
+                                  </p:stCondLst>
+                                  <p:childTnLst>
+                                    <p:animEffect transition="out" filter="fade">
+                                      <p:cBhvr>
+                                        <p:cTn id="6" dur="500" tmFilter="0, 0; .2, .5; .8, .5; 1, 0"/>
+                                        <p:tgtEl>
+                                          <p:spTgt spid="4"/>
+                                        </p:tgtEl>
+                                      </p:cBhvr>
+                                    </p:animEffect>
+                                    <p:animScale>
+                                      <p:cBhvr>
+                                        <p:cTn id="7" dur="250" autoRev="1" fill="hold"/>
+                                        <p:tgtEl>
+                                          <p:spTgt spid="4"/>
+                                        </p:tgtEl>
+                                      </p:cBhvr>
+                                      <p:by x="105000" y="105000"/>
+                                    </p:animScale>
+                                  </p:childTnLst>
+                                </p:cTn>
+                              </p:par>
+                            </p:childTnLst>
+                          </p:cTn>
+                        </p:par>
+                      </p:childTnLst>
+                    </p:cTn>
+                  </p:par>
+                </p:childTnLst>
+              </p:cTn>
+              <p:prevCondLst>
+                <p:cond evt="onPrev" delay="0">
+                  <p:tgtEl>
+                    <p:sldTgt/>
+                  </p:tgtEl>
+                </p:cond>
+              </p:prevCondLst>
+              <p:nextCondLst>
+                <p:cond evt="onNext" delay="0">
+                  <p:tgtEl>
+                    <p:sldTgt/>
+                  </p:tgtEl>
+                </p:cond>
+              </p:nextCondLst>
+            </p:seq>
+          </p:childTnLst>
+        </p:cTn>
+      </p:par>
+    </p:tnLst>
+  </p:timing>
 </p:sld>
 </file>
 
@@ -20095,6 +22517,18 @@
   <p:clrMapOvr>
     <a:masterClrMapping/>
   </p:clrMapOvr>
+  <mc:AlternateContent xmlns:mc="http://schemas.openxmlformats.org/markup-compatibility/2006">
+    <mc:Choice xmlns:p14="http://schemas.microsoft.com/office/powerpoint/2010/main" Requires="p14">
+      <p:transition spd="slow" p14:dur="1500">
+        <p:split orient="vert"/>
+      </p:transition>
+    </mc:Choice>
+    <mc:Fallback>
+      <p:transition spd="slow">
+        <p:split orient="vert"/>
+      </p:transition>
+    </mc:Fallback>
+  </mc:AlternateContent>
 </p:sld>
 </file>
 
@@ -20930,6 +23364,144 @@
   <p:clrMapOvr>
     <a:masterClrMapping/>
   </p:clrMapOvr>
+  <p:transition spd="med">
+    <p:pull/>
+  </p:transition>
+  <p:timing>
+    <p:tnLst>
+      <p:par>
+        <p:cTn id="1" dur="indefinite" restart="never" nodeType="tmRoot">
+          <p:childTnLst>
+            <p:seq concurrent="1" nextAc="seek">
+              <p:cTn id="2" dur="indefinite" nodeType="mainSeq">
+                <p:childTnLst>
+                  <p:par>
+                    <p:cTn id="3" fill="hold">
+                      <p:stCondLst>
+                        <p:cond delay="indefinite"/>
+                        <p:cond evt="onBegin" delay="0">
+                          <p:tn val="2"/>
+                        </p:cond>
+                      </p:stCondLst>
+                      <p:childTnLst>
+                        <p:par>
+                          <p:cTn id="4" fill="hold">
+                            <p:stCondLst>
+                              <p:cond delay="0"/>
+                            </p:stCondLst>
+                            <p:childTnLst>
+                              <p:par>
+                                <p:cTn id="5" presetID="32" presetClass="emph" presetSubtype="0" fill="hold" nodeType="afterEffect">
+                                  <p:stCondLst>
+                                    <p:cond delay="0"/>
+                                  </p:stCondLst>
+                                  <p:childTnLst>
+                                    <p:animRot by="120000">
+                                      <p:cBhvr>
+                                        <p:cTn id="6" dur="100" fill="hold">
+                                          <p:stCondLst>
+                                            <p:cond delay="0"/>
+                                          </p:stCondLst>
+                                        </p:cTn>
+                                        <p:tgtEl>
+                                          <p:spTgt spid="17"/>
+                                        </p:tgtEl>
+                                        <p:attrNameLst>
+                                          <p:attrName>r</p:attrName>
+                                        </p:attrNameLst>
+                                      </p:cBhvr>
+                                    </p:animRot>
+                                    <p:animRot by="-240000">
+                                      <p:cBhvr>
+                                        <p:cTn id="7" dur="200" fill="hold">
+                                          <p:stCondLst>
+                                            <p:cond delay="200"/>
+                                          </p:stCondLst>
+                                        </p:cTn>
+                                        <p:tgtEl>
+                                          <p:spTgt spid="17"/>
+                                        </p:tgtEl>
+                                        <p:attrNameLst>
+                                          <p:attrName>r</p:attrName>
+                                        </p:attrNameLst>
+                                      </p:cBhvr>
+                                    </p:animRot>
+                                    <p:animRot by="240000">
+                                      <p:cBhvr>
+                                        <p:cTn id="8" dur="200" fill="hold">
+                                          <p:stCondLst>
+                                            <p:cond delay="400"/>
+                                          </p:stCondLst>
+                                        </p:cTn>
+                                        <p:tgtEl>
+                                          <p:spTgt spid="17"/>
+                                        </p:tgtEl>
+                                        <p:attrNameLst>
+                                          <p:attrName>r</p:attrName>
+                                        </p:attrNameLst>
+                                      </p:cBhvr>
+                                    </p:animRot>
+                                    <p:animRot by="-240000">
+                                      <p:cBhvr>
+                                        <p:cTn id="9" dur="200" fill="hold">
+                                          <p:stCondLst>
+                                            <p:cond delay="600"/>
+                                          </p:stCondLst>
+                                        </p:cTn>
+                                        <p:tgtEl>
+                                          <p:spTgt spid="17"/>
+                                        </p:tgtEl>
+                                        <p:attrNameLst>
+                                          <p:attrName>r</p:attrName>
+                                        </p:attrNameLst>
+                                      </p:cBhvr>
+                                    </p:animRot>
+                                    <p:animRot by="120000">
+                                      <p:cBhvr>
+                                        <p:cTn id="10" dur="200" fill="hold">
+                                          <p:stCondLst>
+                                            <p:cond delay="800"/>
+                                          </p:stCondLst>
+                                        </p:cTn>
+                                        <p:tgtEl>
+                                          <p:spTgt spid="17"/>
+                                        </p:tgtEl>
+                                        <p:attrNameLst>
+                                          <p:attrName>r</p:attrName>
+                                        </p:attrNameLst>
+                                      </p:cBhvr>
+                                    </p:animRot>
+                                  </p:childTnLst>
+                                </p:cTn>
+                              </p:par>
+                            </p:childTnLst>
+                          </p:cTn>
+                        </p:par>
+                      </p:childTnLst>
+                    </p:cTn>
+                  </p:par>
+                </p:childTnLst>
+              </p:cTn>
+              <p:prevCondLst>
+                <p:cond evt="onPrev" delay="0">
+                  <p:tgtEl>
+                    <p:sldTgt/>
+                  </p:tgtEl>
+                </p:cond>
+              </p:prevCondLst>
+              <p:nextCondLst>
+                <p:cond evt="onNext" delay="0">
+                  <p:tgtEl>
+                    <p:sldTgt/>
+                  </p:tgtEl>
+                </p:cond>
+              </p:nextCondLst>
+            </p:seq>
+          </p:childTnLst>
+        </p:cTn>
+      </p:par>
+    </p:tnLst>
+  </p:timing>
 </p:sld>
 </file>
 

</xml_diff>